<commit_message>
Deployed e511f4d with MkDocs version: 1.1.2
</commit_message>
<xml_diff>
--- a/images/servers.pptx
+++ b/images/servers.pptx
@@ -5,7 +5,9 @@
     <p:sldMasterId id="2147483648" r:id="rId1"/>
   </p:sldMasterIdLst>
   <p:sldIdLst>
-    <p:sldId id="261" r:id="rId2"/>
+    <p:sldId id="263" r:id="rId2"/>
+    <p:sldId id="262" r:id="rId3"/>
+    <p:sldId id="261" r:id="rId4"/>
   </p:sldIdLst>
   <p:sldSz cx="12192000" cy="6858000"/>
   <p:notesSz cx="6858000" cy="9144000"/>
@@ -104,6 +106,11 @@
       </a:defRPr>
     </a:lvl9pPr>
   </p:defaultTextStyle>
+  <p:extLst>
+    <p:ext uri="{EFAFB233-063F-42B5-8137-9DF3F51BA10A}">
+      <p15:sldGuideLst xmlns:p15="http://schemas.microsoft.com/office/powerpoint/2012/main"/>
+    </p:ext>
+  </p:extLst>
 </p:presentation>
 </file>
 
@@ -254,7 +261,7 @@
           <a:p>
             <a:fld id="{373CA23E-C693-41C8-829C-06F40BC0A371}" type="datetimeFigureOut">
               <a:rPr lang="en-US" smtClean="0"/>
-              <a:t>1/24/2021</a:t>
+              <a:t>2/7/2021</a:t>
             </a:fld>
             <a:endParaRPr lang="en-US"/>
           </a:p>
@@ -452,7 +459,7 @@
           <a:p>
             <a:fld id="{373CA23E-C693-41C8-829C-06F40BC0A371}" type="datetimeFigureOut">
               <a:rPr lang="en-US" smtClean="0"/>
-              <a:t>1/24/2021</a:t>
+              <a:t>2/7/2021</a:t>
             </a:fld>
             <a:endParaRPr lang="en-US"/>
           </a:p>
@@ -660,7 +667,7 @@
           <a:p>
             <a:fld id="{373CA23E-C693-41C8-829C-06F40BC0A371}" type="datetimeFigureOut">
               <a:rPr lang="en-US" smtClean="0"/>
-              <a:t>1/24/2021</a:t>
+              <a:t>2/7/2021</a:t>
             </a:fld>
             <a:endParaRPr lang="en-US"/>
           </a:p>
@@ -858,7 +865,7 @@
           <a:p>
             <a:fld id="{373CA23E-C693-41C8-829C-06F40BC0A371}" type="datetimeFigureOut">
               <a:rPr lang="en-US" smtClean="0"/>
-              <a:t>1/24/2021</a:t>
+              <a:t>2/7/2021</a:t>
             </a:fld>
             <a:endParaRPr lang="en-US"/>
           </a:p>
@@ -1133,7 +1140,7 @@
           <a:p>
             <a:fld id="{373CA23E-C693-41C8-829C-06F40BC0A371}" type="datetimeFigureOut">
               <a:rPr lang="en-US" smtClean="0"/>
-              <a:t>1/24/2021</a:t>
+              <a:t>2/7/2021</a:t>
             </a:fld>
             <a:endParaRPr lang="en-US"/>
           </a:p>
@@ -1398,7 +1405,7 @@
           <a:p>
             <a:fld id="{373CA23E-C693-41C8-829C-06F40BC0A371}" type="datetimeFigureOut">
               <a:rPr lang="en-US" smtClean="0"/>
-              <a:t>1/24/2021</a:t>
+              <a:t>2/7/2021</a:t>
             </a:fld>
             <a:endParaRPr lang="en-US"/>
           </a:p>
@@ -1810,7 +1817,7 @@
           <a:p>
             <a:fld id="{373CA23E-C693-41C8-829C-06F40BC0A371}" type="datetimeFigureOut">
               <a:rPr lang="en-US" smtClean="0"/>
-              <a:t>1/24/2021</a:t>
+              <a:t>2/7/2021</a:t>
             </a:fld>
             <a:endParaRPr lang="en-US"/>
           </a:p>
@@ -1951,7 +1958,7 @@
           <a:p>
             <a:fld id="{373CA23E-C693-41C8-829C-06F40BC0A371}" type="datetimeFigureOut">
               <a:rPr lang="en-US" smtClean="0"/>
-              <a:t>1/24/2021</a:t>
+              <a:t>2/7/2021</a:t>
             </a:fld>
             <a:endParaRPr lang="en-US"/>
           </a:p>
@@ -2064,7 +2071,7 @@
           <a:p>
             <a:fld id="{373CA23E-C693-41C8-829C-06F40BC0A371}" type="datetimeFigureOut">
               <a:rPr lang="en-US" smtClean="0"/>
-              <a:t>1/24/2021</a:t>
+              <a:t>2/7/2021</a:t>
             </a:fld>
             <a:endParaRPr lang="en-US"/>
           </a:p>
@@ -2375,7 +2382,7 @@
           <a:p>
             <a:fld id="{373CA23E-C693-41C8-829C-06F40BC0A371}" type="datetimeFigureOut">
               <a:rPr lang="en-US" smtClean="0"/>
-              <a:t>1/24/2021</a:t>
+              <a:t>2/7/2021</a:t>
             </a:fld>
             <a:endParaRPr lang="en-US"/>
           </a:p>
@@ -2663,7 +2670,7 @@
           <a:p>
             <a:fld id="{373CA23E-C693-41C8-829C-06F40BC0A371}" type="datetimeFigureOut">
               <a:rPr lang="en-US" smtClean="0"/>
-              <a:t>1/24/2021</a:t>
+              <a:t>2/7/2021</a:t>
             </a:fld>
             <a:endParaRPr lang="en-US"/>
           </a:p>
@@ -2904,7 +2911,7 @@
           <a:p>
             <a:fld id="{373CA23E-C693-41C8-829C-06F40BC0A371}" type="datetimeFigureOut">
               <a:rPr lang="en-US" smtClean="0"/>
-              <a:t>1/24/2021</a:t>
+              <a:t>2/7/2021</a:t>
             </a:fld>
             <a:endParaRPr lang="en-US"/>
           </a:p>
@@ -3323,6 +3330,2304 @@
       </p:grpSpPr>
       <p:sp>
         <p:nvSpPr>
+          <p:cNvPr id="28" name="Arrow: Right 27">
+            <a:extLst>
+              <a:ext uri="{FF2B5EF4-FFF2-40B4-BE49-F238E27FC236}">
+                <a16:creationId xmlns:a16="http://schemas.microsoft.com/office/drawing/2014/main" id="{CF3F8D32-4206-4BDE-B581-71AE064F8F87}"/>
+              </a:ext>
+            </a:extLst>
+          </p:cNvPr>
+          <p:cNvSpPr/>
+          <p:nvPr/>
+        </p:nvSpPr>
+        <p:spPr>
+          <a:xfrm rot="20700000">
+            <a:off x="7393160" y="3839261"/>
+            <a:ext cx="1252140" cy="431390"/>
+          </a:xfrm>
+          <a:prstGeom prst="rightArrow">
+            <a:avLst/>
+          </a:prstGeom>
+          <a:solidFill>
+            <a:schemeClr val="bg1">
+              <a:lumMod val="75000"/>
+            </a:schemeClr>
+          </a:solidFill>
+          <a:ln>
+            <a:noFill/>
+          </a:ln>
+        </p:spPr>
+        <p:style>
+          <a:lnRef idx="2">
+            <a:schemeClr val="dk1">
+              <a:shade val="50000"/>
+            </a:schemeClr>
+          </a:lnRef>
+          <a:fillRef idx="1">
+            <a:schemeClr val="dk1"/>
+          </a:fillRef>
+          <a:effectRef idx="0">
+            <a:schemeClr val="dk1"/>
+          </a:effectRef>
+          <a:fontRef idx="minor">
+            <a:schemeClr val="lt1"/>
+          </a:fontRef>
+        </p:style>
+        <p:txBody>
+          <a:bodyPr rtlCol="0" anchor="ctr"/>
+          <a:lstStyle/>
+          <a:p>
+            <a:pPr algn="ctr"/>
+            <a:r>
+              <a:rPr lang="en-US" sz="1400" dirty="0" err="1"/>
+              <a:t>ssh</a:t>
+            </a:r>
+            <a:r>
+              <a:rPr lang="en-US" sz="1400" dirty="0"/>
+              <a:t>-copy-id</a:t>
+            </a:r>
+          </a:p>
+        </p:txBody>
+      </p:sp>
+      <p:sp>
+        <p:nvSpPr>
+          <p:cNvPr id="2" name="Flowchart: Delay 1">
+            <a:extLst>
+              <a:ext uri="{FF2B5EF4-FFF2-40B4-BE49-F238E27FC236}">
+                <a16:creationId xmlns:a16="http://schemas.microsoft.com/office/drawing/2014/main" id="{61185E52-0282-4793-879A-CC239DDF728E}"/>
+              </a:ext>
+            </a:extLst>
+          </p:cNvPr>
+          <p:cNvSpPr/>
+          <p:nvPr/>
+        </p:nvSpPr>
+        <p:spPr>
+          <a:xfrm flipH="1">
+            <a:off x="3792424" y="0"/>
+            <a:ext cx="7272599" cy="3379087"/>
+          </a:xfrm>
+          <a:prstGeom prst="flowChartDelay">
+            <a:avLst/>
+          </a:prstGeom>
+          <a:noFill/>
+          <a:ln w="57150">
+            <a:solidFill>
+              <a:schemeClr val="bg1">
+                <a:lumMod val="75000"/>
+              </a:schemeClr>
+            </a:solidFill>
+          </a:ln>
+        </p:spPr>
+        <p:style>
+          <a:lnRef idx="2">
+            <a:schemeClr val="accent1">
+              <a:shade val="50000"/>
+            </a:schemeClr>
+          </a:lnRef>
+          <a:fillRef idx="1">
+            <a:schemeClr val="accent1"/>
+          </a:fillRef>
+          <a:effectRef idx="0">
+            <a:schemeClr val="accent1"/>
+          </a:effectRef>
+          <a:fontRef idx="minor">
+            <a:schemeClr val="lt1"/>
+          </a:fontRef>
+        </p:style>
+        <p:txBody>
+          <a:bodyPr rtlCol="0" anchor="ctr"/>
+          <a:lstStyle/>
+          <a:p>
+            <a:pPr algn="ctr"/>
+            <a:endParaRPr lang="en-US"/>
+          </a:p>
+        </p:txBody>
+      </p:sp>
+      <p:pic>
+        <p:nvPicPr>
+          <p:cNvPr id="1026" name="Picture 2">
+            <a:extLst>
+              <a:ext uri="{FF2B5EF4-FFF2-40B4-BE49-F238E27FC236}">
+                <a16:creationId xmlns:a16="http://schemas.microsoft.com/office/drawing/2014/main" id="{3D707E18-3DF7-4511-A6CB-B57EB4BEA123}"/>
+              </a:ext>
+            </a:extLst>
+          </p:cNvPr>
+          <p:cNvPicPr>
+            <a:picLocks noChangeAspect="1" noChangeArrowheads="1"/>
+          </p:cNvPicPr>
+          <p:nvPr/>
+        </p:nvPicPr>
+        <p:blipFill>
+          <a:blip r:embed="rId2">
+            <a:clrChange>
+              <a:clrFrom>
+                <a:srgbClr val="FFFFFF"/>
+              </a:clrFrom>
+              <a:clrTo>
+                <a:srgbClr val="FFFFFF">
+                  <a:alpha val="0"/>
+                </a:srgbClr>
+              </a:clrTo>
+            </a:clrChange>
+            <a:extLst>
+              <a:ext uri="{28A0092B-C50C-407E-A947-70E740481C1C}">
+                <a14:useLocalDpi xmlns:a14="http://schemas.microsoft.com/office/drawing/2010/main" val="0"/>
+              </a:ext>
+            </a:extLst>
+          </a:blip>
+          <a:srcRect/>
+          <a:stretch>
+            <a:fillRect/>
+          </a:stretch>
+        </p:blipFill>
+        <p:spPr bwMode="auto">
+          <a:xfrm>
+            <a:off x="8272235" y="1263871"/>
+            <a:ext cx="1431009" cy="1431009"/>
+          </a:xfrm>
+          <a:prstGeom prst="rect">
+            <a:avLst/>
+          </a:prstGeom>
+          <a:noFill/>
+          <a:extLst>
+            <a:ext uri="{909E8E84-426E-40DD-AFC4-6F175D3DCCD1}">
+              <a14:hiddenFill xmlns:a14="http://schemas.microsoft.com/office/drawing/2010/main">
+                <a:solidFill>
+                  <a:srgbClr val="FFFFFF"/>
+                </a:solidFill>
+              </a14:hiddenFill>
+            </a:ext>
+          </a:extLst>
+        </p:spPr>
+      </p:pic>
+      <p:sp>
+        <p:nvSpPr>
+          <p:cNvPr id="8" name="TextBox 7">
+            <a:extLst>
+              <a:ext uri="{FF2B5EF4-FFF2-40B4-BE49-F238E27FC236}">
+                <a16:creationId xmlns:a16="http://schemas.microsoft.com/office/drawing/2014/main" id="{C0430528-0095-4CD9-9D5D-8680DC8EDA65}"/>
+              </a:ext>
+            </a:extLst>
+          </p:cNvPr>
+          <p:cNvSpPr txBox="1"/>
+          <p:nvPr/>
+        </p:nvSpPr>
+        <p:spPr>
+          <a:xfrm>
+            <a:off x="7431584" y="577725"/>
+            <a:ext cx="1775294" cy="523220"/>
+          </a:xfrm>
+          <a:prstGeom prst="rect">
+            <a:avLst/>
+          </a:prstGeom>
+          <a:noFill/>
+        </p:spPr>
+        <p:txBody>
+          <a:bodyPr wrap="none" rtlCol="0">
+            <a:spAutoFit/>
+          </a:bodyPr>
+          <a:lstStyle/>
+          <a:p>
+            <a:pPr algn="ctr"/>
+            <a:r>
+              <a:rPr lang="en-US" sz="1400" dirty="0"/>
+              <a:t>CS servers</a:t>
+            </a:r>
+          </a:p>
+          <a:p>
+            <a:pPr algn="ctr"/>
+            <a:r>
+              <a:rPr lang="en-US" sz="1400" dirty="0"/>
+              <a:t>(labsrv06, granger1…)</a:t>
+            </a:r>
+          </a:p>
+        </p:txBody>
+      </p:sp>
+      <p:grpSp>
+        <p:nvGrpSpPr>
+          <p:cNvPr id="10" name="Group 9">
+            <a:extLst>
+              <a:ext uri="{FF2B5EF4-FFF2-40B4-BE49-F238E27FC236}">
+                <a16:creationId xmlns:a16="http://schemas.microsoft.com/office/drawing/2014/main" id="{173D03B8-9C63-4BAF-94E4-EB4EC78D85F2}"/>
+              </a:ext>
+            </a:extLst>
+          </p:cNvPr>
+          <p:cNvGrpSpPr/>
+          <p:nvPr/>
+        </p:nvGrpSpPr>
+        <p:grpSpPr>
+          <a:xfrm>
+            <a:off x="265493" y="434410"/>
+            <a:ext cx="1783760" cy="1968231"/>
+            <a:chOff x="832435" y="2014387"/>
+            <a:chExt cx="2671416" cy="2947687"/>
+          </a:xfrm>
+        </p:grpSpPr>
+        <p:pic>
+          <p:nvPicPr>
+            <p:cNvPr id="1028" name="Picture 4" descr="Laptop Icon | Download Pretty Office Part 10 icons | IconsPedia">
+              <a:extLst>
+                <a:ext uri="{FF2B5EF4-FFF2-40B4-BE49-F238E27FC236}">
+                  <a16:creationId xmlns:a16="http://schemas.microsoft.com/office/drawing/2014/main" id="{CF98CDBD-D8DF-4970-BD5C-94949E3808F1}"/>
+                </a:ext>
+              </a:extLst>
+            </p:cNvPr>
+            <p:cNvPicPr>
+              <a:picLocks noChangeAspect="1" noChangeArrowheads="1"/>
+            </p:cNvPicPr>
+            <p:nvPr/>
+          </p:nvPicPr>
+          <p:blipFill>
+            <a:blip r:embed="rId3">
+              <a:extLst>
+                <a:ext uri="{28A0092B-C50C-407E-A947-70E740481C1C}">
+                  <a14:useLocalDpi xmlns:a14="http://schemas.microsoft.com/office/drawing/2010/main" val="0"/>
+                </a:ext>
+              </a:extLst>
+            </a:blip>
+            <a:srcRect/>
+            <a:stretch>
+              <a:fillRect/>
+            </a:stretch>
+          </p:blipFill>
+          <p:spPr bwMode="auto">
+            <a:xfrm>
+              <a:off x="832435" y="2014387"/>
+              <a:ext cx="2671416" cy="2671416"/>
+            </a:xfrm>
+            <a:prstGeom prst="rect">
+              <a:avLst/>
+            </a:prstGeom>
+            <a:noFill/>
+            <a:extLst>
+              <a:ext uri="{909E8E84-426E-40DD-AFC4-6F175D3DCCD1}">
+                <a14:hiddenFill xmlns:a14="http://schemas.microsoft.com/office/drawing/2010/main">
+                  <a:solidFill>
+                    <a:srgbClr val="FFFFFF"/>
+                  </a:solidFill>
+                </a14:hiddenFill>
+              </a:ext>
+            </a:extLst>
+          </p:spPr>
+        </p:pic>
+        <p:sp>
+          <p:nvSpPr>
+            <p:cNvPr id="5" name="TextBox 4">
+              <a:extLst>
+                <a:ext uri="{FF2B5EF4-FFF2-40B4-BE49-F238E27FC236}">
+                  <a16:creationId xmlns:a16="http://schemas.microsoft.com/office/drawing/2014/main" id="{C48E2B29-4735-421F-BCB9-C527F947F726}"/>
+                </a:ext>
+              </a:extLst>
+            </p:cNvPr>
+            <p:cNvSpPr txBox="1"/>
+            <p:nvPr/>
+          </p:nvSpPr>
+          <p:spPr>
+            <a:xfrm>
+              <a:off x="1032892" y="4501137"/>
+              <a:ext cx="2328497" cy="460937"/>
+            </a:xfrm>
+            <a:prstGeom prst="rect">
+              <a:avLst/>
+            </a:prstGeom>
+            <a:noFill/>
+          </p:spPr>
+          <p:txBody>
+            <a:bodyPr wrap="none" rtlCol="0">
+              <a:spAutoFit/>
+            </a:bodyPr>
+            <a:lstStyle/>
+            <a:p>
+              <a:pPr algn="ctr"/>
+              <a:r>
+                <a:rPr lang="en-US" sz="1400" dirty="0"/>
+                <a:t>Your local machine</a:t>
+              </a:r>
+            </a:p>
+          </p:txBody>
+        </p:sp>
+        <p:pic>
+          <p:nvPicPr>
+            <p:cNvPr id="1030" name="Picture 6" descr="Intel VTune Amplifier">
+              <a:extLst>
+                <a:ext uri="{FF2B5EF4-FFF2-40B4-BE49-F238E27FC236}">
+                  <a16:creationId xmlns:a16="http://schemas.microsoft.com/office/drawing/2014/main" id="{574852F0-6E3A-4C4B-A4F4-E7BB48C5BA9B}"/>
+                </a:ext>
+              </a:extLst>
+            </p:cNvPr>
+            <p:cNvPicPr>
+              <a:picLocks noChangeAspect="1" noChangeArrowheads="1"/>
+            </p:cNvPicPr>
+            <p:nvPr/>
+          </p:nvPicPr>
+          <p:blipFill>
+            <a:blip r:embed="rId4">
+              <a:extLst>
+                <a:ext uri="{28A0092B-C50C-407E-A947-70E740481C1C}">
+                  <a14:useLocalDpi xmlns:a14="http://schemas.microsoft.com/office/drawing/2010/main" val="0"/>
+                </a:ext>
+              </a:extLst>
+            </a:blip>
+            <a:srcRect/>
+            <a:stretch>
+              <a:fillRect/>
+            </a:stretch>
+          </p:blipFill>
+          <p:spPr bwMode="auto">
+            <a:xfrm>
+              <a:off x="1569978" y="2651405"/>
+              <a:ext cx="959614" cy="641339"/>
+            </a:xfrm>
+            <a:prstGeom prst="rect">
+              <a:avLst/>
+            </a:prstGeom>
+            <a:noFill/>
+            <a:extLst>
+              <a:ext uri="{909E8E84-426E-40DD-AFC4-6F175D3DCCD1}">
+                <a14:hiddenFill xmlns:a14="http://schemas.microsoft.com/office/drawing/2010/main">
+                  <a:solidFill>
+                    <a:srgbClr val="FFFFFF"/>
+                  </a:solidFill>
+                </a14:hiddenFill>
+              </a:ext>
+            </a:extLst>
+          </p:spPr>
+        </p:pic>
+      </p:grpSp>
+      <p:pic>
+        <p:nvPicPr>
+          <p:cNvPr id="1032" name="Picture 8">
+            <a:extLst>
+              <a:ext uri="{FF2B5EF4-FFF2-40B4-BE49-F238E27FC236}">
+                <a16:creationId xmlns:a16="http://schemas.microsoft.com/office/drawing/2014/main" id="{5FBF93A0-BE8C-4558-ABAB-088FB617E41C}"/>
+              </a:ext>
+            </a:extLst>
+          </p:cNvPr>
+          <p:cNvPicPr>
+            <a:picLocks noChangeAspect="1" noChangeArrowheads="1"/>
+          </p:cNvPicPr>
+          <p:nvPr/>
+        </p:nvPicPr>
+        <p:blipFill>
+          <a:blip r:embed="rId5">
+            <a:clrChange>
+              <a:clrFrom>
+                <a:srgbClr val="FFFFFF"/>
+              </a:clrFrom>
+              <a:clrTo>
+                <a:srgbClr val="FFFFFF">
+                  <a:alpha val="0"/>
+                </a:srgbClr>
+              </a:clrTo>
+            </a:clrChange>
+            <a:extLst>
+              <a:ext uri="{28A0092B-C50C-407E-A947-70E740481C1C}">
+                <a14:useLocalDpi xmlns:a14="http://schemas.microsoft.com/office/drawing/2010/main" val="0"/>
+              </a:ext>
+            </a:extLst>
+          </a:blip>
+          <a:srcRect/>
+          <a:stretch>
+            <a:fillRect/>
+          </a:stretch>
+        </p:blipFill>
+        <p:spPr bwMode="auto">
+          <a:xfrm>
+            <a:off x="1207098" y="1600043"/>
+            <a:ext cx="531904" cy="531904"/>
+          </a:xfrm>
+          <a:prstGeom prst="rect">
+            <a:avLst/>
+          </a:prstGeom>
+          <a:noFill/>
+          <a:extLst>
+            <a:ext uri="{909E8E84-426E-40DD-AFC4-6F175D3DCCD1}">
+              <a14:hiddenFill xmlns:a14="http://schemas.microsoft.com/office/drawing/2010/main">
+                <a:solidFill>
+                  <a:srgbClr val="FFFFFF"/>
+                </a:solidFill>
+              </a14:hiddenFill>
+            </a:ext>
+          </a:extLst>
+        </p:spPr>
+      </p:pic>
+      <p:pic>
+        <p:nvPicPr>
+          <p:cNvPr id="32" name="Picture 2">
+            <a:extLst>
+              <a:ext uri="{FF2B5EF4-FFF2-40B4-BE49-F238E27FC236}">
+                <a16:creationId xmlns:a16="http://schemas.microsoft.com/office/drawing/2014/main" id="{8B72C3E9-85E6-4CA7-A422-7AFC5B84BC1E}"/>
+              </a:ext>
+            </a:extLst>
+          </p:cNvPr>
+          <p:cNvPicPr>
+            <a:picLocks noChangeAspect="1" noChangeArrowheads="1"/>
+          </p:cNvPicPr>
+          <p:nvPr/>
+        </p:nvPicPr>
+        <p:blipFill>
+          <a:blip r:embed="rId2">
+            <a:clrChange>
+              <a:clrFrom>
+                <a:srgbClr val="FFFFFF"/>
+              </a:clrFrom>
+              <a:clrTo>
+                <a:srgbClr val="FFFFFF">
+                  <a:alpha val="0"/>
+                </a:srgbClr>
+              </a:clrTo>
+            </a:clrChange>
+            <a:duotone>
+              <a:schemeClr val="accent2">
+                <a:shade val="45000"/>
+                <a:satMod val="135000"/>
+              </a:schemeClr>
+              <a:prstClr val="white"/>
+            </a:duotone>
+            <a:extLst>
+              <a:ext uri="{28A0092B-C50C-407E-A947-70E740481C1C}">
+                <a14:useLocalDpi xmlns:a14="http://schemas.microsoft.com/office/drawing/2010/main" val="0"/>
+              </a:ext>
+            </a:extLst>
+          </a:blip>
+          <a:srcRect/>
+          <a:stretch>
+            <a:fillRect/>
+          </a:stretch>
+        </p:blipFill>
+        <p:spPr bwMode="auto">
+          <a:xfrm>
+            <a:off x="3217972" y="1339635"/>
+            <a:ext cx="1431009" cy="1431009"/>
+          </a:xfrm>
+          <a:prstGeom prst="rect">
+            <a:avLst/>
+          </a:prstGeom>
+          <a:noFill/>
+          <a:extLst>
+            <a:ext uri="{909E8E84-426E-40DD-AFC4-6F175D3DCCD1}">
+              <a14:hiddenFill xmlns:a14="http://schemas.microsoft.com/office/drawing/2010/main">
+                <a:solidFill>
+                  <a:srgbClr val="FFFFFF"/>
+                </a:solidFill>
+              </a14:hiddenFill>
+            </a:ext>
+          </a:extLst>
+        </p:spPr>
+      </p:pic>
+      <p:sp>
+        <p:nvSpPr>
+          <p:cNvPr id="18" name="Arrow: Left-Right 17">
+            <a:extLst>
+              <a:ext uri="{FF2B5EF4-FFF2-40B4-BE49-F238E27FC236}">
+                <a16:creationId xmlns:a16="http://schemas.microsoft.com/office/drawing/2014/main" id="{7868ACE6-6A31-4C35-897B-DCC2F01F9732}"/>
+              </a:ext>
+            </a:extLst>
+          </p:cNvPr>
+          <p:cNvSpPr/>
+          <p:nvPr/>
+        </p:nvSpPr>
+        <p:spPr>
+          <a:xfrm>
+            <a:off x="2081748" y="1548011"/>
+            <a:ext cx="913726" cy="220481"/>
+          </a:xfrm>
+          <a:prstGeom prst="leftRightArrow">
+            <a:avLst/>
+          </a:prstGeom>
+          <a:solidFill>
+            <a:schemeClr val="bg1">
+              <a:lumMod val="75000"/>
+            </a:schemeClr>
+          </a:solidFill>
+          <a:ln>
+            <a:noFill/>
+          </a:ln>
+        </p:spPr>
+        <p:style>
+          <a:lnRef idx="2">
+            <a:schemeClr val="dk1">
+              <a:shade val="50000"/>
+            </a:schemeClr>
+          </a:lnRef>
+          <a:fillRef idx="1">
+            <a:schemeClr val="dk1"/>
+          </a:fillRef>
+          <a:effectRef idx="0">
+            <a:schemeClr val="dk1"/>
+          </a:effectRef>
+          <a:fontRef idx="minor">
+            <a:schemeClr val="lt1"/>
+          </a:fontRef>
+        </p:style>
+        <p:txBody>
+          <a:bodyPr rtlCol="0" anchor="ctr"/>
+          <a:lstStyle/>
+          <a:p>
+            <a:pPr algn="ctr"/>
+            <a:endParaRPr lang="en-US" sz="1400"/>
+          </a:p>
+        </p:txBody>
+      </p:sp>
+      <p:sp>
+        <p:nvSpPr>
+          <p:cNvPr id="19" name="TextBox 18">
+            <a:extLst>
+              <a:ext uri="{FF2B5EF4-FFF2-40B4-BE49-F238E27FC236}">
+                <a16:creationId xmlns:a16="http://schemas.microsoft.com/office/drawing/2014/main" id="{5B2539B0-17EF-4224-8DB4-04686653A754}"/>
+              </a:ext>
+            </a:extLst>
+          </p:cNvPr>
+          <p:cNvSpPr txBox="1"/>
+          <p:nvPr/>
+        </p:nvSpPr>
+        <p:spPr>
+          <a:xfrm>
+            <a:off x="1954128" y="1310862"/>
+            <a:ext cx="1187261" cy="307777"/>
+          </a:xfrm>
+          <a:prstGeom prst="rect">
+            <a:avLst/>
+          </a:prstGeom>
+          <a:noFill/>
+        </p:spPr>
+        <p:txBody>
+          <a:bodyPr wrap="square" rtlCol="0">
+            <a:spAutoFit/>
+          </a:bodyPr>
+          <a:lstStyle/>
+          <a:p>
+            <a:pPr algn="ctr"/>
+            <a:r>
+              <a:rPr lang="en-US" sz="1400" dirty="0"/>
+              <a:t>SSH</a:t>
+            </a:r>
+          </a:p>
+        </p:txBody>
+      </p:sp>
+      <p:sp>
+        <p:nvSpPr>
+          <p:cNvPr id="33" name="TextBox 32">
+            <a:extLst>
+              <a:ext uri="{FF2B5EF4-FFF2-40B4-BE49-F238E27FC236}">
+                <a16:creationId xmlns:a16="http://schemas.microsoft.com/office/drawing/2014/main" id="{F6395334-AA74-4B7C-B517-1F45D4FC927A}"/>
+              </a:ext>
+            </a:extLst>
+          </p:cNvPr>
+          <p:cNvSpPr txBox="1"/>
+          <p:nvPr/>
+        </p:nvSpPr>
+        <p:spPr>
+          <a:xfrm>
+            <a:off x="2980151" y="1086706"/>
+            <a:ext cx="1708994" cy="307777"/>
+          </a:xfrm>
+          <a:prstGeom prst="rect">
+            <a:avLst/>
+          </a:prstGeom>
+          <a:noFill/>
+        </p:spPr>
+        <p:txBody>
+          <a:bodyPr wrap="none" rtlCol="0">
+            <a:spAutoFit/>
+          </a:bodyPr>
+          <a:lstStyle/>
+          <a:p>
+            <a:pPr algn="ctr"/>
+            <a:r>
+              <a:rPr lang="en-US" sz="1400" dirty="0"/>
+              <a:t>portal.cs.virginia.edu</a:t>
+            </a:r>
+          </a:p>
+        </p:txBody>
+      </p:sp>
+      <p:sp>
+        <p:nvSpPr>
+          <p:cNvPr id="40" name="Arrow: Left-Right 39">
+            <a:extLst>
+              <a:ext uri="{FF2B5EF4-FFF2-40B4-BE49-F238E27FC236}">
+                <a16:creationId xmlns:a16="http://schemas.microsoft.com/office/drawing/2014/main" id="{CCF156F0-AB31-4C8F-A79F-DA4DB8869AC8}"/>
+              </a:ext>
+            </a:extLst>
+          </p:cNvPr>
+          <p:cNvSpPr/>
+          <p:nvPr/>
+        </p:nvSpPr>
+        <p:spPr>
+          <a:xfrm rot="20700000">
+            <a:off x="5809296" y="1561069"/>
+            <a:ext cx="1420150" cy="220481"/>
+          </a:xfrm>
+          <a:prstGeom prst="leftRightArrow">
+            <a:avLst/>
+          </a:prstGeom>
+          <a:solidFill>
+            <a:schemeClr val="bg1">
+              <a:lumMod val="75000"/>
+            </a:schemeClr>
+          </a:solidFill>
+          <a:ln>
+            <a:noFill/>
+          </a:ln>
+        </p:spPr>
+        <p:style>
+          <a:lnRef idx="2">
+            <a:schemeClr val="dk1">
+              <a:shade val="50000"/>
+            </a:schemeClr>
+          </a:lnRef>
+          <a:fillRef idx="1">
+            <a:schemeClr val="dk1"/>
+          </a:fillRef>
+          <a:effectRef idx="0">
+            <a:schemeClr val="dk1"/>
+          </a:effectRef>
+          <a:fontRef idx="minor">
+            <a:schemeClr val="lt1"/>
+          </a:fontRef>
+        </p:style>
+        <p:txBody>
+          <a:bodyPr rtlCol="0" anchor="ctr"/>
+          <a:lstStyle/>
+          <a:p>
+            <a:pPr algn="ctr"/>
+            <a:endParaRPr lang="en-US" sz="1400"/>
+          </a:p>
+        </p:txBody>
+      </p:sp>
+      <p:sp>
+        <p:nvSpPr>
+          <p:cNvPr id="44" name="TextBox 43">
+            <a:extLst>
+              <a:ext uri="{FF2B5EF4-FFF2-40B4-BE49-F238E27FC236}">
+                <a16:creationId xmlns:a16="http://schemas.microsoft.com/office/drawing/2014/main" id="{F477C592-041F-4086-B4F1-1B4F9303EE00}"/>
+              </a:ext>
+            </a:extLst>
+          </p:cNvPr>
+          <p:cNvSpPr txBox="1"/>
+          <p:nvPr/>
+        </p:nvSpPr>
+        <p:spPr>
+          <a:xfrm>
+            <a:off x="6054964" y="209430"/>
+            <a:ext cx="1785617" cy="307777"/>
+          </a:xfrm>
+          <a:prstGeom prst="rect">
+            <a:avLst/>
+          </a:prstGeom>
+          <a:noFill/>
+        </p:spPr>
+        <p:txBody>
+          <a:bodyPr wrap="none" rtlCol="0">
+            <a:spAutoFit/>
+          </a:bodyPr>
+          <a:lstStyle/>
+          <a:p>
+            <a:pPr algn="ctr"/>
+            <a:r>
+              <a:rPr lang="en-US" sz="1400" dirty="0"/>
+              <a:t>UVA campus network</a:t>
+            </a:r>
+          </a:p>
+        </p:txBody>
+      </p:sp>
+      <p:sp>
+        <p:nvSpPr>
+          <p:cNvPr id="46" name="TextBox 45">
+            <a:extLst>
+              <a:ext uri="{FF2B5EF4-FFF2-40B4-BE49-F238E27FC236}">
+                <a16:creationId xmlns:a16="http://schemas.microsoft.com/office/drawing/2014/main" id="{B8EAED92-ED35-4786-801D-DD7A58C39078}"/>
+              </a:ext>
+            </a:extLst>
+          </p:cNvPr>
+          <p:cNvSpPr txBox="1"/>
+          <p:nvPr/>
+        </p:nvSpPr>
+        <p:spPr>
+          <a:xfrm>
+            <a:off x="5130550" y="1084268"/>
+            <a:ext cx="1187261" cy="307777"/>
+          </a:xfrm>
+          <a:prstGeom prst="rect">
+            <a:avLst/>
+          </a:prstGeom>
+          <a:noFill/>
+        </p:spPr>
+        <p:txBody>
+          <a:bodyPr wrap="square" rtlCol="0">
+            <a:spAutoFit/>
+          </a:bodyPr>
+          <a:lstStyle/>
+          <a:p>
+            <a:pPr algn="ctr"/>
+            <a:r>
+              <a:rPr lang="en-US" sz="1400" dirty="0"/>
+              <a:t>SSH</a:t>
+            </a:r>
+          </a:p>
+        </p:txBody>
+      </p:sp>
+      <p:sp>
+        <p:nvSpPr>
+          <p:cNvPr id="3" name="TextBox 2">
+            <a:extLst>
+              <a:ext uri="{FF2B5EF4-FFF2-40B4-BE49-F238E27FC236}">
+                <a16:creationId xmlns:a16="http://schemas.microsoft.com/office/drawing/2014/main" id="{A7637A5D-BC2A-4906-B785-01B01A6D5FF3}"/>
+              </a:ext>
+            </a:extLst>
+          </p:cNvPr>
+          <p:cNvSpPr txBox="1"/>
+          <p:nvPr/>
+        </p:nvSpPr>
+        <p:spPr>
+          <a:xfrm>
+            <a:off x="0" y="3082692"/>
+            <a:ext cx="4486275" cy="2492990"/>
+          </a:xfrm>
+          <a:prstGeom prst="rect">
+            <a:avLst/>
+          </a:prstGeom>
+          <a:noFill/>
+        </p:spPr>
+        <p:txBody>
+          <a:bodyPr wrap="square" rtlCol="0">
+            <a:spAutoFit/>
+          </a:bodyPr>
+          <a:lstStyle/>
+          <a:p>
+            <a:r>
+              <a:rPr lang="en-US" sz="1200" b="1" dirty="0">
+                <a:latin typeface="Courier New" panose="02070309020205020404" pitchFamily="49" charset="0"/>
+                <a:cs typeface="Courier New" panose="02070309020205020404" pitchFamily="49" charset="0"/>
+              </a:rPr>
+              <a:t>~/.</a:t>
+            </a:r>
+            <a:r>
+              <a:rPr lang="en-US" sz="1200" b="1" dirty="0" err="1">
+                <a:latin typeface="Courier New" panose="02070309020205020404" pitchFamily="49" charset="0"/>
+                <a:cs typeface="Courier New" panose="02070309020205020404" pitchFamily="49" charset="0"/>
+              </a:rPr>
+              <a:t>ssh</a:t>
+            </a:r>
+            <a:r>
+              <a:rPr lang="en-US" sz="1200" b="1" dirty="0">
+                <a:latin typeface="Courier New" panose="02070309020205020404" pitchFamily="49" charset="0"/>
+                <a:cs typeface="Courier New" panose="02070309020205020404" pitchFamily="49" charset="0"/>
+              </a:rPr>
+              <a:t>/</a:t>
+            </a:r>
+            <a:r>
+              <a:rPr lang="en-US" sz="1200" dirty="0">
+                <a:latin typeface="Courier New" panose="02070309020205020404" pitchFamily="49" charset="0"/>
+                <a:cs typeface="Courier New" panose="02070309020205020404" pitchFamily="49" charset="0"/>
+              </a:rPr>
+              <a:t> (Linux or WSL) or </a:t>
+            </a:r>
+            <a:r>
+              <a:rPr lang="en-US" sz="1200" b="1" dirty="0">
+                <a:latin typeface="Courier New" panose="02070309020205020404" pitchFamily="49" charset="0"/>
+                <a:cs typeface="Courier New" panose="02070309020205020404" pitchFamily="49" charset="0"/>
+              </a:rPr>
+              <a:t>C:\Users\%USERNAME%\.ssh\</a:t>
+            </a:r>
+            <a:r>
+              <a:rPr lang="en-US" sz="1200" dirty="0">
+                <a:latin typeface="Courier New" panose="02070309020205020404" pitchFamily="49" charset="0"/>
+                <a:cs typeface="Courier New" panose="02070309020205020404" pitchFamily="49" charset="0"/>
+              </a:rPr>
+              <a:t> (Windows)</a:t>
+            </a:r>
+          </a:p>
+          <a:p>
+            <a:r>
+              <a:rPr lang="en-US" sz="1200" b="1" dirty="0">
+                <a:latin typeface="Courier New" panose="02070309020205020404" pitchFamily="49" charset="0"/>
+                <a:cs typeface="Courier New" panose="02070309020205020404" pitchFamily="49" charset="0"/>
+              </a:rPr>
+              <a:t>  id_rsa.pub    </a:t>
+            </a:r>
+          </a:p>
+          <a:p>
+            <a:r>
+              <a:rPr lang="en-US" sz="1200" dirty="0">
+                <a:latin typeface="Courier New" panose="02070309020205020404" pitchFamily="49" charset="0"/>
+                <a:cs typeface="Courier New" panose="02070309020205020404" pitchFamily="49" charset="0"/>
+              </a:rPr>
+              <a:t>  # </a:t>
+            </a:r>
+            <a:r>
+              <a:rPr lang="en-US" sz="1200" dirty="0" err="1">
+                <a:latin typeface="Courier New" panose="02070309020205020404" pitchFamily="49" charset="0"/>
+                <a:cs typeface="Courier New" panose="02070309020205020404" pitchFamily="49" charset="0"/>
+              </a:rPr>
+              <a:t>pubkey</a:t>
+            </a:r>
+            <a:r>
+              <a:rPr lang="en-US" sz="1200" dirty="0">
+                <a:latin typeface="Courier New" panose="02070309020205020404" pitchFamily="49" charset="0"/>
+                <a:cs typeface="Courier New" panose="02070309020205020404" pitchFamily="49" charset="0"/>
+              </a:rPr>
+              <a:t> of your local machine. can share with others (e.g. the server)</a:t>
+            </a:r>
+          </a:p>
+          <a:p>
+            <a:endParaRPr lang="en-US" sz="1200" dirty="0">
+              <a:latin typeface="Courier New" panose="02070309020205020404" pitchFamily="49" charset="0"/>
+              <a:cs typeface="Courier New" panose="02070309020205020404" pitchFamily="49" charset="0"/>
+            </a:endParaRPr>
+          </a:p>
+          <a:p>
+            <a:r>
+              <a:rPr lang="en-US" sz="1200" b="1" dirty="0">
+                <a:latin typeface="Courier New" panose="02070309020205020404" pitchFamily="49" charset="0"/>
+                <a:cs typeface="Courier New" panose="02070309020205020404" pitchFamily="49" charset="0"/>
+              </a:rPr>
+              <a:t>  </a:t>
+            </a:r>
+            <a:r>
+              <a:rPr lang="en-US" sz="1200" b="1" dirty="0" err="1">
+                <a:latin typeface="Courier New" panose="02070309020205020404" pitchFamily="49" charset="0"/>
+                <a:cs typeface="Courier New" panose="02070309020205020404" pitchFamily="49" charset="0"/>
+              </a:rPr>
+              <a:t>id_rsa</a:t>
+            </a:r>
+            <a:r>
+              <a:rPr lang="en-US" sz="1200" b="1" dirty="0">
+                <a:latin typeface="Courier New" panose="02070309020205020404" pitchFamily="49" charset="0"/>
+                <a:cs typeface="Courier New" panose="02070309020205020404" pitchFamily="49" charset="0"/>
+              </a:rPr>
+              <a:t> </a:t>
+            </a:r>
+          </a:p>
+          <a:p>
+            <a:r>
+              <a:rPr lang="en-US" sz="1200" dirty="0">
+                <a:latin typeface="Courier New" panose="02070309020205020404" pitchFamily="49" charset="0"/>
+                <a:cs typeface="Courier New" panose="02070309020205020404" pitchFamily="49" charset="0"/>
+              </a:rPr>
+              <a:t>  # private key (the secret) of your local machine. do not share with others</a:t>
+            </a:r>
+          </a:p>
+          <a:p>
+            <a:endParaRPr lang="en-US" sz="1200" dirty="0">
+              <a:latin typeface="Courier New" panose="02070309020205020404" pitchFamily="49" charset="0"/>
+              <a:cs typeface="Courier New" panose="02070309020205020404" pitchFamily="49" charset="0"/>
+            </a:endParaRPr>
+          </a:p>
+          <a:p>
+            <a:r>
+              <a:rPr lang="en-US" sz="1200" b="1" dirty="0">
+                <a:latin typeface="Courier New" panose="02070309020205020404" pitchFamily="49" charset="0"/>
+                <a:cs typeface="Courier New" panose="02070309020205020404" pitchFamily="49" charset="0"/>
+              </a:rPr>
+              <a:t>  config </a:t>
+            </a:r>
+          </a:p>
+          <a:p>
+            <a:r>
+              <a:rPr lang="en-US" sz="1200" dirty="0">
+                <a:latin typeface="Courier New" panose="02070309020205020404" pitchFamily="49" charset="0"/>
+                <a:cs typeface="Courier New" panose="02070309020205020404" pitchFamily="49" charset="0"/>
+              </a:rPr>
+              <a:t> # configuration. contains the shortcuts for known hosts, etc.</a:t>
+            </a:r>
+          </a:p>
+        </p:txBody>
+      </p:sp>
+      <p:sp>
+        <p:nvSpPr>
+          <p:cNvPr id="25" name="TextBox 24">
+            <a:extLst>
+              <a:ext uri="{FF2B5EF4-FFF2-40B4-BE49-F238E27FC236}">
+                <a16:creationId xmlns:a16="http://schemas.microsoft.com/office/drawing/2014/main" id="{B6673528-B641-415A-B50F-4B5AA2C1FDEB}"/>
+              </a:ext>
+            </a:extLst>
+          </p:cNvPr>
+          <p:cNvSpPr txBox="1"/>
+          <p:nvPr/>
+        </p:nvSpPr>
+        <p:spPr>
+          <a:xfrm>
+            <a:off x="4536335" y="3232250"/>
+            <a:ext cx="3575369" cy="3046988"/>
+          </a:xfrm>
+          <a:prstGeom prst="rect">
+            <a:avLst/>
+          </a:prstGeom>
+          <a:noFill/>
+        </p:spPr>
+        <p:txBody>
+          <a:bodyPr wrap="square" rtlCol="0">
+            <a:spAutoFit/>
+          </a:bodyPr>
+          <a:lstStyle/>
+          <a:p>
+            <a:r>
+              <a:rPr lang="en-US" sz="1200" b="1" dirty="0">
+                <a:latin typeface="Courier New" panose="02070309020205020404" pitchFamily="49" charset="0"/>
+                <a:cs typeface="Courier New" panose="02070309020205020404" pitchFamily="49" charset="0"/>
+              </a:rPr>
+              <a:t>~/.</a:t>
+            </a:r>
+            <a:r>
+              <a:rPr lang="en-US" sz="1200" b="1" dirty="0" err="1">
+                <a:latin typeface="Courier New" panose="02070309020205020404" pitchFamily="49" charset="0"/>
+                <a:cs typeface="Courier New" panose="02070309020205020404" pitchFamily="49" charset="0"/>
+              </a:rPr>
+              <a:t>ssh</a:t>
+            </a:r>
+            <a:r>
+              <a:rPr lang="en-US" sz="1200" b="1" dirty="0">
+                <a:latin typeface="Courier New" panose="02070309020205020404" pitchFamily="49" charset="0"/>
+                <a:cs typeface="Courier New" panose="02070309020205020404" pitchFamily="49" charset="0"/>
+              </a:rPr>
+              <a:t>/</a:t>
+            </a:r>
+            <a:r>
+              <a:rPr lang="en-US" sz="1200" dirty="0">
+                <a:latin typeface="Courier New" panose="02070309020205020404" pitchFamily="49" charset="0"/>
+                <a:cs typeface="Courier New" panose="02070309020205020404" pitchFamily="49" charset="0"/>
+              </a:rPr>
+              <a:t> (permission: 700)</a:t>
+            </a:r>
+          </a:p>
+          <a:p>
+            <a:r>
+              <a:rPr lang="en-US" sz="1200" b="1" dirty="0">
+                <a:latin typeface="Courier New" panose="02070309020205020404" pitchFamily="49" charset="0"/>
+                <a:cs typeface="Courier New" panose="02070309020205020404" pitchFamily="49" charset="0"/>
+              </a:rPr>
+              <a:t>  </a:t>
+            </a:r>
+            <a:r>
+              <a:rPr lang="en-US" sz="1200" b="1" dirty="0" err="1">
+                <a:latin typeface="Courier New" panose="02070309020205020404" pitchFamily="49" charset="0"/>
+                <a:cs typeface="Courier New" panose="02070309020205020404" pitchFamily="49" charset="0"/>
+              </a:rPr>
+              <a:t>authorized_keys</a:t>
+            </a:r>
+            <a:r>
+              <a:rPr lang="en-US" sz="1200" b="1" dirty="0">
+                <a:latin typeface="Courier New" panose="02070309020205020404" pitchFamily="49" charset="0"/>
+                <a:cs typeface="Courier New" panose="02070309020205020404" pitchFamily="49" charset="0"/>
+              </a:rPr>
+              <a:t> </a:t>
+            </a:r>
+            <a:r>
+              <a:rPr lang="en-US" sz="1200" dirty="0">
+                <a:latin typeface="Courier New" panose="02070309020205020404" pitchFamily="49" charset="0"/>
+                <a:cs typeface="Courier New" panose="02070309020205020404" pitchFamily="49" charset="0"/>
+              </a:rPr>
+              <a:t>(permission:600)</a:t>
+            </a:r>
+            <a:endParaRPr lang="en-US" sz="1200" b="1" dirty="0">
+              <a:latin typeface="Courier New" panose="02070309020205020404" pitchFamily="49" charset="0"/>
+              <a:cs typeface="Courier New" panose="02070309020205020404" pitchFamily="49" charset="0"/>
+            </a:endParaRPr>
+          </a:p>
+          <a:p>
+            <a:r>
+              <a:rPr lang="en-US" sz="1200" dirty="0">
+                <a:latin typeface="Courier New" panose="02070309020205020404" pitchFamily="49" charset="0"/>
+                <a:cs typeface="Courier New" panose="02070309020205020404" pitchFamily="49" charset="0"/>
+              </a:rPr>
+              <a:t>  # a list of </a:t>
+            </a:r>
+            <a:r>
+              <a:rPr lang="en-US" sz="1200" dirty="0" err="1">
+                <a:latin typeface="Courier New" panose="02070309020205020404" pitchFamily="49" charset="0"/>
+                <a:cs typeface="Courier New" panose="02070309020205020404" pitchFamily="49" charset="0"/>
+              </a:rPr>
+              <a:t>pubkeys</a:t>
+            </a:r>
+            <a:r>
+              <a:rPr lang="en-US" sz="1200" dirty="0">
+                <a:latin typeface="Courier New" panose="02070309020205020404" pitchFamily="49" charset="0"/>
+                <a:cs typeface="Courier New" panose="02070309020205020404" pitchFamily="49" charset="0"/>
+              </a:rPr>
+              <a:t> the portal accepts</a:t>
+            </a:r>
+          </a:p>
+          <a:p>
+            <a:endParaRPr lang="en-US" sz="1200" dirty="0">
+              <a:latin typeface="Courier New" panose="02070309020205020404" pitchFamily="49" charset="0"/>
+              <a:cs typeface="Courier New" panose="02070309020205020404" pitchFamily="49" charset="0"/>
+            </a:endParaRPr>
+          </a:p>
+          <a:p>
+            <a:r>
+              <a:rPr lang="en-US" sz="1200" b="1" dirty="0">
+                <a:latin typeface="Courier New" panose="02070309020205020404" pitchFamily="49" charset="0"/>
+                <a:cs typeface="Courier New" panose="02070309020205020404" pitchFamily="49" charset="0"/>
+              </a:rPr>
+              <a:t>  id_rsa.pub  </a:t>
+            </a:r>
+          </a:p>
+          <a:p>
+            <a:r>
+              <a:rPr lang="en-US" sz="1200" dirty="0">
+                <a:latin typeface="Courier New" panose="02070309020205020404" pitchFamily="49" charset="0"/>
+                <a:cs typeface="Courier New" panose="02070309020205020404" pitchFamily="49" charset="0"/>
+              </a:rPr>
+              <a:t>  # </a:t>
+            </a:r>
+            <a:r>
+              <a:rPr lang="en-US" sz="1200" dirty="0" err="1">
+                <a:latin typeface="Courier New" panose="02070309020205020404" pitchFamily="49" charset="0"/>
+                <a:cs typeface="Courier New" panose="02070309020205020404" pitchFamily="49" charset="0"/>
+              </a:rPr>
+              <a:t>pubkey</a:t>
+            </a:r>
+            <a:r>
+              <a:rPr lang="en-US" sz="1200" dirty="0">
+                <a:latin typeface="Courier New" panose="02070309020205020404" pitchFamily="49" charset="0"/>
+                <a:cs typeface="Courier New" panose="02070309020205020404" pitchFamily="49" charset="0"/>
+              </a:rPr>
+              <a:t> of your account on portal. can differ from your local machine’s id_rsa.pub</a:t>
+            </a:r>
+          </a:p>
+          <a:p>
+            <a:endParaRPr lang="en-US" sz="1200" dirty="0">
+              <a:latin typeface="Courier New" panose="02070309020205020404" pitchFamily="49" charset="0"/>
+              <a:cs typeface="Courier New" panose="02070309020205020404" pitchFamily="49" charset="0"/>
+            </a:endParaRPr>
+          </a:p>
+          <a:p>
+            <a:r>
+              <a:rPr lang="en-US" sz="1200" b="1" dirty="0">
+                <a:latin typeface="Courier New" panose="02070309020205020404" pitchFamily="49" charset="0"/>
+                <a:cs typeface="Courier New" panose="02070309020205020404" pitchFamily="49" charset="0"/>
+              </a:rPr>
+              <a:t>  </a:t>
+            </a:r>
+            <a:r>
+              <a:rPr lang="en-US" sz="1200" b="1" dirty="0" err="1">
+                <a:latin typeface="Courier New" panose="02070309020205020404" pitchFamily="49" charset="0"/>
+                <a:cs typeface="Courier New" panose="02070309020205020404" pitchFamily="49" charset="0"/>
+              </a:rPr>
+              <a:t>id_rsa</a:t>
+            </a:r>
+            <a:r>
+              <a:rPr lang="en-US" sz="1200" b="1" dirty="0">
+                <a:latin typeface="Courier New" panose="02070309020205020404" pitchFamily="49" charset="0"/>
+                <a:cs typeface="Courier New" panose="02070309020205020404" pitchFamily="49" charset="0"/>
+              </a:rPr>
+              <a:t> </a:t>
+            </a:r>
+            <a:r>
+              <a:rPr lang="en-US" sz="1200" dirty="0">
+                <a:latin typeface="Courier New" panose="02070309020205020404" pitchFamily="49" charset="0"/>
+                <a:cs typeface="Courier New" panose="02070309020205020404" pitchFamily="49" charset="0"/>
+              </a:rPr>
+              <a:t>(permission:600)</a:t>
+            </a:r>
+            <a:endParaRPr lang="en-US" sz="1200" b="1" dirty="0">
+              <a:latin typeface="Courier New" panose="02070309020205020404" pitchFamily="49" charset="0"/>
+              <a:cs typeface="Courier New" panose="02070309020205020404" pitchFamily="49" charset="0"/>
+            </a:endParaRPr>
+          </a:p>
+          <a:p>
+            <a:r>
+              <a:rPr lang="en-US" sz="1200" dirty="0">
+                <a:latin typeface="Courier New" panose="02070309020205020404" pitchFamily="49" charset="0"/>
+                <a:cs typeface="Courier New" panose="02070309020205020404" pitchFamily="49" charset="0"/>
+              </a:rPr>
+              <a:t>  # private key. the secret of your account on portal. can differ from your local machine’s </a:t>
+            </a:r>
+            <a:r>
+              <a:rPr lang="en-US" sz="1200" dirty="0" err="1">
+                <a:latin typeface="Courier New" panose="02070309020205020404" pitchFamily="49" charset="0"/>
+                <a:cs typeface="Courier New" panose="02070309020205020404" pitchFamily="49" charset="0"/>
+              </a:rPr>
+              <a:t>id_rsa</a:t>
+            </a:r>
+            <a:endParaRPr lang="en-US" sz="1200" dirty="0">
+              <a:latin typeface="Courier New" panose="02070309020205020404" pitchFamily="49" charset="0"/>
+              <a:cs typeface="Courier New" panose="02070309020205020404" pitchFamily="49" charset="0"/>
+            </a:endParaRPr>
+          </a:p>
+          <a:p>
+            <a:endParaRPr lang="en-US" sz="1200" dirty="0">
+              <a:latin typeface="Courier New" panose="02070309020205020404" pitchFamily="49" charset="0"/>
+              <a:cs typeface="Courier New" panose="02070309020205020404" pitchFamily="49" charset="0"/>
+            </a:endParaRPr>
+          </a:p>
+          <a:p>
+            <a:r>
+              <a:rPr lang="en-US" sz="1200" dirty="0">
+                <a:latin typeface="Courier New" panose="02070309020205020404" pitchFamily="49" charset="0"/>
+                <a:cs typeface="Courier New" panose="02070309020205020404" pitchFamily="49" charset="0"/>
+              </a:rPr>
+              <a:t>  </a:t>
+            </a:r>
+            <a:r>
+              <a:rPr lang="en-US" sz="1200" b="1" dirty="0">
+                <a:latin typeface="Courier New" panose="02070309020205020404" pitchFamily="49" charset="0"/>
+                <a:cs typeface="Courier New" panose="02070309020205020404" pitchFamily="49" charset="0"/>
+              </a:rPr>
+              <a:t>config</a:t>
+            </a:r>
+          </a:p>
+        </p:txBody>
+      </p:sp>
+      <p:sp>
+        <p:nvSpPr>
+          <p:cNvPr id="26" name="TextBox 25">
+            <a:extLst>
+              <a:ext uri="{FF2B5EF4-FFF2-40B4-BE49-F238E27FC236}">
+                <a16:creationId xmlns:a16="http://schemas.microsoft.com/office/drawing/2014/main" id="{DBB01832-4067-46B0-A223-2871252C3716}"/>
+              </a:ext>
+            </a:extLst>
+          </p:cNvPr>
+          <p:cNvSpPr txBox="1"/>
+          <p:nvPr/>
+        </p:nvSpPr>
+        <p:spPr>
+          <a:xfrm>
+            <a:off x="8392515" y="3370749"/>
+            <a:ext cx="3575368" cy="1015663"/>
+          </a:xfrm>
+          <a:prstGeom prst="rect">
+            <a:avLst/>
+          </a:prstGeom>
+          <a:noFill/>
+        </p:spPr>
+        <p:txBody>
+          <a:bodyPr wrap="square" rtlCol="0">
+            <a:spAutoFit/>
+          </a:bodyPr>
+          <a:lstStyle/>
+          <a:p>
+            <a:r>
+              <a:rPr lang="en-US" sz="1200" b="1" dirty="0">
+                <a:latin typeface="Courier New" panose="02070309020205020404" pitchFamily="49" charset="0"/>
+                <a:cs typeface="Courier New" panose="02070309020205020404" pitchFamily="49" charset="0"/>
+              </a:rPr>
+              <a:t>~/.</a:t>
+            </a:r>
+            <a:r>
+              <a:rPr lang="en-US" sz="1200" b="1" dirty="0" err="1">
+                <a:latin typeface="Courier New" panose="02070309020205020404" pitchFamily="49" charset="0"/>
+                <a:cs typeface="Courier New" panose="02070309020205020404" pitchFamily="49" charset="0"/>
+              </a:rPr>
+              <a:t>ssh</a:t>
+            </a:r>
+            <a:r>
+              <a:rPr lang="en-US" sz="1200" b="1" dirty="0">
+                <a:latin typeface="Courier New" panose="02070309020205020404" pitchFamily="49" charset="0"/>
+                <a:cs typeface="Courier New" panose="02070309020205020404" pitchFamily="49" charset="0"/>
+              </a:rPr>
+              <a:t>/</a:t>
+            </a:r>
+            <a:r>
+              <a:rPr lang="en-US" sz="1200" dirty="0">
+                <a:latin typeface="Courier New" panose="02070309020205020404" pitchFamily="49" charset="0"/>
+                <a:cs typeface="Courier New" panose="02070309020205020404" pitchFamily="49" charset="0"/>
+              </a:rPr>
+              <a:t> </a:t>
+            </a:r>
+          </a:p>
+          <a:p>
+            <a:r>
+              <a:rPr lang="en-US" sz="1200" b="1" dirty="0">
+                <a:latin typeface="Courier New" panose="02070309020205020404" pitchFamily="49" charset="0"/>
+                <a:cs typeface="Courier New" panose="02070309020205020404" pitchFamily="49" charset="0"/>
+              </a:rPr>
+              <a:t>  </a:t>
+            </a:r>
+            <a:r>
+              <a:rPr lang="en-US" sz="1200" b="1" dirty="0" err="1">
+                <a:latin typeface="Courier New" panose="02070309020205020404" pitchFamily="49" charset="0"/>
+                <a:cs typeface="Courier New" panose="02070309020205020404" pitchFamily="49" charset="0"/>
+              </a:rPr>
+              <a:t>authorized_keys</a:t>
+            </a:r>
+            <a:r>
+              <a:rPr lang="en-US" sz="1200" b="1" dirty="0">
+                <a:latin typeface="Courier New" panose="02070309020205020404" pitchFamily="49" charset="0"/>
+                <a:cs typeface="Courier New" panose="02070309020205020404" pitchFamily="49" charset="0"/>
+              </a:rPr>
+              <a:t> </a:t>
+            </a:r>
+            <a:r>
+              <a:rPr lang="en-US" sz="1200" dirty="0">
+                <a:latin typeface="Courier New" panose="02070309020205020404" pitchFamily="49" charset="0"/>
+                <a:cs typeface="Courier New" panose="02070309020205020404" pitchFamily="49" charset="0"/>
+              </a:rPr>
+              <a:t>(permission: 600)</a:t>
+            </a:r>
+            <a:endParaRPr lang="en-US" sz="1200" b="1" dirty="0">
+              <a:latin typeface="Courier New" panose="02070309020205020404" pitchFamily="49" charset="0"/>
+              <a:cs typeface="Courier New" panose="02070309020205020404" pitchFamily="49" charset="0"/>
+            </a:endParaRPr>
+          </a:p>
+          <a:p>
+            <a:r>
+              <a:rPr lang="en-US" sz="1200" dirty="0">
+                <a:latin typeface="Courier New" panose="02070309020205020404" pitchFamily="49" charset="0"/>
+                <a:cs typeface="Courier New" panose="02070309020205020404" pitchFamily="49" charset="0"/>
+              </a:rPr>
+              <a:t>  # a list of </a:t>
+            </a:r>
+            <a:r>
+              <a:rPr lang="en-US" sz="1200" dirty="0" err="1">
+                <a:latin typeface="Courier New" panose="02070309020205020404" pitchFamily="49" charset="0"/>
+                <a:cs typeface="Courier New" panose="02070309020205020404" pitchFamily="49" charset="0"/>
+              </a:rPr>
+              <a:t>pubkeys</a:t>
+            </a:r>
+            <a:r>
+              <a:rPr lang="en-US" sz="1200" dirty="0">
+                <a:latin typeface="Courier New" panose="02070309020205020404" pitchFamily="49" charset="0"/>
+                <a:cs typeface="Courier New" panose="02070309020205020404" pitchFamily="49" charset="0"/>
+              </a:rPr>
+              <a:t> the server accepts</a:t>
+            </a:r>
+          </a:p>
+          <a:p>
+            <a:endParaRPr lang="en-US" sz="1200" dirty="0">
+              <a:latin typeface="Courier New" panose="02070309020205020404" pitchFamily="49" charset="0"/>
+              <a:cs typeface="Courier New" panose="02070309020205020404" pitchFamily="49" charset="0"/>
+            </a:endParaRPr>
+          </a:p>
+        </p:txBody>
+      </p:sp>
+      <p:sp>
+        <p:nvSpPr>
+          <p:cNvPr id="27" name="Arrow: Right 26">
+            <a:extLst>
+              <a:ext uri="{FF2B5EF4-FFF2-40B4-BE49-F238E27FC236}">
+                <a16:creationId xmlns:a16="http://schemas.microsoft.com/office/drawing/2014/main" id="{349C7016-2E91-4CE0-B6DE-A54343AC074A}"/>
+              </a:ext>
+            </a:extLst>
+          </p:cNvPr>
+          <p:cNvSpPr/>
+          <p:nvPr/>
+        </p:nvSpPr>
+        <p:spPr>
+          <a:xfrm>
+            <a:off x="3330652" y="3350241"/>
+            <a:ext cx="1275185" cy="431390"/>
+          </a:xfrm>
+          <a:prstGeom prst="rightArrow">
+            <a:avLst/>
+          </a:prstGeom>
+          <a:solidFill>
+            <a:schemeClr val="bg1">
+              <a:lumMod val="75000"/>
+            </a:schemeClr>
+          </a:solidFill>
+          <a:ln>
+            <a:noFill/>
+          </a:ln>
+        </p:spPr>
+        <p:style>
+          <a:lnRef idx="2">
+            <a:schemeClr val="dk1">
+              <a:shade val="50000"/>
+            </a:schemeClr>
+          </a:lnRef>
+          <a:fillRef idx="1">
+            <a:schemeClr val="dk1"/>
+          </a:fillRef>
+          <a:effectRef idx="0">
+            <a:schemeClr val="dk1"/>
+          </a:effectRef>
+          <a:fontRef idx="minor">
+            <a:schemeClr val="lt1"/>
+          </a:fontRef>
+        </p:style>
+        <p:txBody>
+          <a:bodyPr rtlCol="0" anchor="ctr"/>
+          <a:lstStyle/>
+          <a:p>
+            <a:pPr algn="ctr"/>
+            <a:r>
+              <a:rPr lang="en-US" sz="1400" dirty="0" err="1"/>
+              <a:t>ssh</a:t>
+            </a:r>
+            <a:r>
+              <a:rPr lang="en-US" sz="1400" dirty="0"/>
+              <a:t>-copy-id</a:t>
+            </a:r>
+          </a:p>
+        </p:txBody>
+      </p:sp>
+      <p:sp>
+        <p:nvSpPr>
+          <p:cNvPr id="9" name="Arc 8">
+            <a:extLst>
+              <a:ext uri="{FF2B5EF4-FFF2-40B4-BE49-F238E27FC236}">
+                <a16:creationId xmlns:a16="http://schemas.microsoft.com/office/drawing/2014/main" id="{7EE2BCAB-F0BB-4530-8ACF-345B61F9861A}"/>
+              </a:ext>
+            </a:extLst>
+          </p:cNvPr>
+          <p:cNvSpPr/>
+          <p:nvPr/>
+        </p:nvSpPr>
+        <p:spPr>
+          <a:xfrm rot="2440225">
+            <a:off x="2462280" y="3771665"/>
+            <a:ext cx="689843" cy="863582"/>
+          </a:xfrm>
+          <a:prstGeom prst="arc">
+            <a:avLst/>
+          </a:prstGeom>
+          <a:ln w="38100"/>
+        </p:spPr>
+        <p:style>
+          <a:lnRef idx="1">
+            <a:schemeClr val="accent1"/>
+          </a:lnRef>
+          <a:fillRef idx="0">
+            <a:schemeClr val="accent1"/>
+          </a:fillRef>
+          <a:effectRef idx="0">
+            <a:schemeClr val="accent1"/>
+          </a:effectRef>
+          <a:fontRef idx="minor">
+            <a:schemeClr val="tx1"/>
+          </a:fontRef>
+        </p:style>
+        <p:txBody>
+          <a:bodyPr rtlCol="0" anchor="ctr"/>
+          <a:lstStyle/>
+          <a:p>
+            <a:pPr algn="ctr"/>
+            <a:endParaRPr lang="en-US"/>
+          </a:p>
+        </p:txBody>
+      </p:sp>
+      <p:sp>
+        <p:nvSpPr>
+          <p:cNvPr id="30" name="TextBox 29">
+            <a:extLst>
+              <a:ext uri="{FF2B5EF4-FFF2-40B4-BE49-F238E27FC236}">
+                <a16:creationId xmlns:a16="http://schemas.microsoft.com/office/drawing/2014/main" id="{D89FED5B-08B6-4721-9E6B-914D3B72CDF7}"/>
+              </a:ext>
+            </a:extLst>
+          </p:cNvPr>
+          <p:cNvSpPr txBox="1"/>
+          <p:nvPr/>
+        </p:nvSpPr>
+        <p:spPr>
+          <a:xfrm>
+            <a:off x="3135141" y="3878580"/>
+            <a:ext cx="1187261" cy="523220"/>
+          </a:xfrm>
+          <a:prstGeom prst="rect">
+            <a:avLst/>
+          </a:prstGeom>
+          <a:noFill/>
+        </p:spPr>
+        <p:txBody>
+          <a:bodyPr wrap="square" rtlCol="0">
+            <a:spAutoFit/>
+          </a:bodyPr>
+          <a:lstStyle/>
+          <a:p>
+            <a:pPr algn="ctr"/>
+            <a:r>
+              <a:rPr lang="en-US" sz="1400" b="1" dirty="0"/>
+              <a:t>A pair from “</a:t>
+            </a:r>
+            <a:r>
+              <a:rPr lang="en-US" sz="1400" b="1" dirty="0" err="1"/>
+              <a:t>ssh</a:t>
+            </a:r>
+            <a:r>
+              <a:rPr lang="en-US" sz="1400" b="1" dirty="0"/>
+              <a:t>-keygen”</a:t>
+            </a:r>
+          </a:p>
+        </p:txBody>
+      </p:sp>
+      <p:sp>
+        <p:nvSpPr>
+          <p:cNvPr id="31" name="Arc 30">
+            <a:extLst>
+              <a:ext uri="{FF2B5EF4-FFF2-40B4-BE49-F238E27FC236}">
+                <a16:creationId xmlns:a16="http://schemas.microsoft.com/office/drawing/2014/main" id="{EFEFAA50-7B10-4FDA-AE74-D878C8B669BC}"/>
+              </a:ext>
+            </a:extLst>
+          </p:cNvPr>
+          <p:cNvSpPr/>
+          <p:nvPr/>
+        </p:nvSpPr>
+        <p:spPr>
+          <a:xfrm rot="2440225">
+            <a:off x="6717463" y="4617497"/>
+            <a:ext cx="689843" cy="863582"/>
+          </a:xfrm>
+          <a:prstGeom prst="arc">
+            <a:avLst/>
+          </a:prstGeom>
+          <a:ln w="38100"/>
+        </p:spPr>
+        <p:style>
+          <a:lnRef idx="1">
+            <a:schemeClr val="accent1"/>
+          </a:lnRef>
+          <a:fillRef idx="0">
+            <a:schemeClr val="accent1"/>
+          </a:fillRef>
+          <a:effectRef idx="0">
+            <a:schemeClr val="accent1"/>
+          </a:effectRef>
+          <a:fontRef idx="minor">
+            <a:schemeClr val="tx1"/>
+          </a:fontRef>
+        </p:style>
+        <p:txBody>
+          <a:bodyPr rtlCol="0" anchor="ctr"/>
+          <a:lstStyle/>
+          <a:p>
+            <a:pPr algn="ctr"/>
+            <a:endParaRPr lang="en-US"/>
+          </a:p>
+        </p:txBody>
+      </p:sp>
+      <p:sp>
+        <p:nvSpPr>
+          <p:cNvPr id="34" name="TextBox 33">
+            <a:extLst>
+              <a:ext uri="{FF2B5EF4-FFF2-40B4-BE49-F238E27FC236}">
+                <a16:creationId xmlns:a16="http://schemas.microsoft.com/office/drawing/2014/main" id="{D19D660A-38A2-467B-8CE8-0F3B445BB97B}"/>
+              </a:ext>
+            </a:extLst>
+          </p:cNvPr>
+          <p:cNvSpPr txBox="1"/>
+          <p:nvPr/>
+        </p:nvSpPr>
+        <p:spPr>
+          <a:xfrm>
+            <a:off x="7492533" y="4719219"/>
+            <a:ext cx="1187261" cy="523220"/>
+          </a:xfrm>
+          <a:prstGeom prst="rect">
+            <a:avLst/>
+          </a:prstGeom>
+          <a:noFill/>
+        </p:spPr>
+        <p:txBody>
+          <a:bodyPr wrap="square" rtlCol="0">
+            <a:spAutoFit/>
+          </a:bodyPr>
+          <a:lstStyle/>
+          <a:p>
+            <a:pPr algn="ctr"/>
+            <a:r>
+              <a:rPr lang="en-US" sz="1400" b="1" dirty="0"/>
+              <a:t>A pair from “</a:t>
+            </a:r>
+            <a:r>
+              <a:rPr lang="en-US" sz="1400" b="1" dirty="0" err="1"/>
+              <a:t>ssh</a:t>
+            </a:r>
+            <a:r>
+              <a:rPr lang="en-US" sz="1400" b="1" dirty="0"/>
+              <a:t>-keygen”</a:t>
+            </a:r>
+          </a:p>
+        </p:txBody>
+      </p:sp>
+    </p:spTree>
+    <p:extLst>
+      <p:ext uri="{BB962C8B-B14F-4D97-AF65-F5344CB8AC3E}">
+        <p14:creationId xmlns:p14="http://schemas.microsoft.com/office/powerpoint/2010/main" val="1026039397"/>
+      </p:ext>
+    </p:extLst>
+  </p:cSld>
+  <p:clrMapOvr>
+    <a:masterClrMapping/>
+  </p:clrMapOvr>
+</p:sld>
+</file>
+
+<file path=ppt/slides/slide2.xml><?xml version="1.0" encoding="utf-8"?>
+<p:sld xmlns:a="http://schemas.openxmlformats.org/drawingml/2006/main" xmlns:r="http://schemas.openxmlformats.org/officeDocument/2006/relationships" xmlns:p="http://schemas.openxmlformats.org/presentationml/2006/main">
+  <p:cSld>
+    <p:spTree>
+      <p:nvGrpSpPr>
+        <p:cNvPr id="1" name=""/>
+        <p:cNvGrpSpPr/>
+        <p:nvPr/>
+      </p:nvGrpSpPr>
+      <p:grpSpPr>
+        <a:xfrm>
+          <a:off x="0" y="0"/>
+          <a:ext cx="0" cy="0"/>
+          <a:chOff x="0" y="0"/>
+          <a:chExt cx="0" cy="0"/>
+        </a:xfrm>
+      </p:grpSpPr>
+      <p:sp>
+        <p:nvSpPr>
+          <p:cNvPr id="2" name="Flowchart: Delay 1">
+            <a:extLst>
+              <a:ext uri="{FF2B5EF4-FFF2-40B4-BE49-F238E27FC236}">
+                <a16:creationId xmlns:a16="http://schemas.microsoft.com/office/drawing/2014/main" id="{61185E52-0282-4793-879A-CC239DDF728E}"/>
+              </a:ext>
+            </a:extLst>
+          </p:cNvPr>
+          <p:cNvSpPr/>
+          <p:nvPr/>
+        </p:nvSpPr>
+        <p:spPr>
+          <a:xfrm flipH="1">
+            <a:off x="3363122" y="177309"/>
+            <a:ext cx="4973837" cy="5009574"/>
+          </a:xfrm>
+          <a:prstGeom prst="flowChartDelay">
+            <a:avLst/>
+          </a:prstGeom>
+          <a:noFill/>
+          <a:ln w="57150">
+            <a:solidFill>
+              <a:schemeClr val="bg1">
+                <a:lumMod val="75000"/>
+              </a:schemeClr>
+            </a:solidFill>
+          </a:ln>
+        </p:spPr>
+        <p:style>
+          <a:lnRef idx="2">
+            <a:schemeClr val="accent1">
+              <a:shade val="50000"/>
+            </a:schemeClr>
+          </a:lnRef>
+          <a:fillRef idx="1">
+            <a:schemeClr val="accent1"/>
+          </a:fillRef>
+          <a:effectRef idx="0">
+            <a:schemeClr val="accent1"/>
+          </a:effectRef>
+          <a:fontRef idx="minor">
+            <a:schemeClr val="lt1"/>
+          </a:fontRef>
+        </p:style>
+        <p:txBody>
+          <a:bodyPr rtlCol="0" anchor="ctr"/>
+          <a:lstStyle/>
+          <a:p>
+            <a:pPr algn="ctr"/>
+            <a:endParaRPr lang="en-US"/>
+          </a:p>
+        </p:txBody>
+      </p:sp>
+      <p:pic>
+        <p:nvPicPr>
+          <p:cNvPr id="1026" name="Picture 2">
+            <a:extLst>
+              <a:ext uri="{FF2B5EF4-FFF2-40B4-BE49-F238E27FC236}">
+                <a16:creationId xmlns:a16="http://schemas.microsoft.com/office/drawing/2014/main" id="{3D707E18-3DF7-4511-A6CB-B57EB4BEA123}"/>
+              </a:ext>
+            </a:extLst>
+          </p:cNvPr>
+          <p:cNvPicPr>
+            <a:picLocks noChangeAspect="1" noChangeArrowheads="1"/>
+          </p:cNvPicPr>
+          <p:nvPr/>
+        </p:nvPicPr>
+        <p:blipFill>
+          <a:blip r:embed="rId2">
+            <a:clrChange>
+              <a:clrFrom>
+                <a:srgbClr val="FFFFFF"/>
+              </a:clrFrom>
+              <a:clrTo>
+                <a:srgbClr val="FFFFFF">
+                  <a:alpha val="0"/>
+                </a:srgbClr>
+              </a:clrTo>
+            </a:clrChange>
+            <a:extLst>
+              <a:ext uri="{28A0092B-C50C-407E-A947-70E740481C1C}">
+                <a14:useLocalDpi xmlns:a14="http://schemas.microsoft.com/office/drawing/2010/main" val="0"/>
+              </a:ext>
+            </a:extLst>
+          </a:blip>
+          <a:srcRect/>
+          <a:stretch>
+            <a:fillRect/>
+          </a:stretch>
+        </p:blipFill>
+        <p:spPr bwMode="auto">
+          <a:xfrm>
+            <a:off x="5797337" y="675047"/>
+            <a:ext cx="1431009" cy="1431009"/>
+          </a:xfrm>
+          <a:prstGeom prst="rect">
+            <a:avLst/>
+          </a:prstGeom>
+          <a:noFill/>
+          <a:extLst>
+            <a:ext uri="{909E8E84-426E-40DD-AFC4-6F175D3DCCD1}">
+              <a14:hiddenFill xmlns:a14="http://schemas.microsoft.com/office/drawing/2010/main">
+                <a:solidFill>
+                  <a:srgbClr val="FFFFFF"/>
+                </a:solidFill>
+              </a14:hiddenFill>
+            </a:ext>
+          </a:extLst>
+        </p:spPr>
+      </p:pic>
+      <p:sp>
+        <p:nvSpPr>
+          <p:cNvPr id="8" name="TextBox 7">
+            <a:extLst>
+              <a:ext uri="{FF2B5EF4-FFF2-40B4-BE49-F238E27FC236}">
+                <a16:creationId xmlns:a16="http://schemas.microsoft.com/office/drawing/2014/main" id="{C0430528-0095-4CD9-9D5D-8680DC8EDA65}"/>
+              </a:ext>
+            </a:extLst>
+          </p:cNvPr>
+          <p:cNvSpPr txBox="1"/>
+          <p:nvPr/>
+        </p:nvSpPr>
+        <p:spPr>
+          <a:xfrm>
+            <a:off x="5684952" y="3942181"/>
+            <a:ext cx="1775294" cy="523220"/>
+          </a:xfrm>
+          <a:prstGeom prst="rect">
+            <a:avLst/>
+          </a:prstGeom>
+          <a:noFill/>
+        </p:spPr>
+        <p:txBody>
+          <a:bodyPr wrap="none" rtlCol="0">
+            <a:spAutoFit/>
+          </a:bodyPr>
+          <a:lstStyle/>
+          <a:p>
+            <a:pPr algn="ctr"/>
+            <a:r>
+              <a:rPr lang="en-US" sz="1400" dirty="0"/>
+              <a:t>CS servers</a:t>
+            </a:r>
+          </a:p>
+          <a:p>
+            <a:pPr algn="ctr"/>
+            <a:r>
+              <a:rPr lang="en-US" sz="1400" dirty="0"/>
+              <a:t>(labsrv06, granger1…)</a:t>
+            </a:r>
+          </a:p>
+        </p:txBody>
+      </p:sp>
+      <p:grpSp>
+        <p:nvGrpSpPr>
+          <p:cNvPr id="10" name="Group 9">
+            <a:extLst>
+              <a:ext uri="{FF2B5EF4-FFF2-40B4-BE49-F238E27FC236}">
+                <a16:creationId xmlns:a16="http://schemas.microsoft.com/office/drawing/2014/main" id="{173D03B8-9C63-4BAF-94E4-EB4EC78D85F2}"/>
+              </a:ext>
+            </a:extLst>
+          </p:cNvPr>
+          <p:cNvGrpSpPr/>
+          <p:nvPr/>
+        </p:nvGrpSpPr>
+        <p:grpSpPr>
+          <a:xfrm>
+            <a:off x="184735" y="1336977"/>
+            <a:ext cx="1783760" cy="1968231"/>
+            <a:chOff x="832435" y="2014387"/>
+            <a:chExt cx="2671416" cy="2947687"/>
+          </a:xfrm>
+        </p:grpSpPr>
+        <p:pic>
+          <p:nvPicPr>
+            <p:cNvPr id="1028" name="Picture 4" descr="Laptop Icon | Download Pretty Office Part 10 icons | IconsPedia">
+              <a:extLst>
+                <a:ext uri="{FF2B5EF4-FFF2-40B4-BE49-F238E27FC236}">
+                  <a16:creationId xmlns:a16="http://schemas.microsoft.com/office/drawing/2014/main" id="{CF98CDBD-D8DF-4970-BD5C-94949E3808F1}"/>
+                </a:ext>
+              </a:extLst>
+            </p:cNvPr>
+            <p:cNvPicPr>
+              <a:picLocks noChangeAspect="1" noChangeArrowheads="1"/>
+            </p:cNvPicPr>
+            <p:nvPr/>
+          </p:nvPicPr>
+          <p:blipFill>
+            <a:blip r:embed="rId3">
+              <a:extLst>
+                <a:ext uri="{28A0092B-C50C-407E-A947-70E740481C1C}">
+                  <a14:useLocalDpi xmlns:a14="http://schemas.microsoft.com/office/drawing/2010/main" val="0"/>
+                </a:ext>
+              </a:extLst>
+            </a:blip>
+            <a:srcRect/>
+            <a:stretch>
+              <a:fillRect/>
+            </a:stretch>
+          </p:blipFill>
+          <p:spPr bwMode="auto">
+            <a:xfrm>
+              <a:off x="832435" y="2014387"/>
+              <a:ext cx="2671416" cy="2671416"/>
+            </a:xfrm>
+            <a:prstGeom prst="rect">
+              <a:avLst/>
+            </a:prstGeom>
+            <a:noFill/>
+            <a:extLst>
+              <a:ext uri="{909E8E84-426E-40DD-AFC4-6F175D3DCCD1}">
+                <a14:hiddenFill xmlns:a14="http://schemas.microsoft.com/office/drawing/2010/main">
+                  <a:solidFill>
+                    <a:srgbClr val="FFFFFF"/>
+                  </a:solidFill>
+                </a14:hiddenFill>
+              </a:ext>
+            </a:extLst>
+          </p:spPr>
+        </p:pic>
+        <p:sp>
+          <p:nvSpPr>
+            <p:cNvPr id="5" name="TextBox 4">
+              <a:extLst>
+                <a:ext uri="{FF2B5EF4-FFF2-40B4-BE49-F238E27FC236}">
+                  <a16:creationId xmlns:a16="http://schemas.microsoft.com/office/drawing/2014/main" id="{C48E2B29-4735-421F-BCB9-C527F947F726}"/>
+                </a:ext>
+              </a:extLst>
+            </p:cNvPr>
+            <p:cNvSpPr txBox="1"/>
+            <p:nvPr/>
+          </p:nvSpPr>
+          <p:spPr>
+            <a:xfrm>
+              <a:off x="1032892" y="4501137"/>
+              <a:ext cx="2328497" cy="460937"/>
+            </a:xfrm>
+            <a:prstGeom prst="rect">
+              <a:avLst/>
+            </a:prstGeom>
+            <a:noFill/>
+          </p:spPr>
+          <p:txBody>
+            <a:bodyPr wrap="none" rtlCol="0">
+              <a:spAutoFit/>
+            </a:bodyPr>
+            <a:lstStyle/>
+            <a:p>
+              <a:pPr algn="ctr"/>
+              <a:r>
+                <a:rPr lang="en-US" sz="1400" dirty="0"/>
+                <a:t>Your local machine</a:t>
+              </a:r>
+            </a:p>
+          </p:txBody>
+        </p:sp>
+        <p:pic>
+          <p:nvPicPr>
+            <p:cNvPr id="1030" name="Picture 6" descr="Intel VTune Amplifier">
+              <a:extLst>
+                <a:ext uri="{FF2B5EF4-FFF2-40B4-BE49-F238E27FC236}">
+                  <a16:creationId xmlns:a16="http://schemas.microsoft.com/office/drawing/2014/main" id="{574852F0-6E3A-4C4B-A4F4-E7BB48C5BA9B}"/>
+                </a:ext>
+              </a:extLst>
+            </p:cNvPr>
+            <p:cNvPicPr>
+              <a:picLocks noChangeAspect="1" noChangeArrowheads="1"/>
+            </p:cNvPicPr>
+            <p:nvPr/>
+          </p:nvPicPr>
+          <p:blipFill>
+            <a:blip r:embed="rId4">
+              <a:extLst>
+                <a:ext uri="{28A0092B-C50C-407E-A947-70E740481C1C}">
+                  <a14:useLocalDpi xmlns:a14="http://schemas.microsoft.com/office/drawing/2010/main" val="0"/>
+                </a:ext>
+              </a:extLst>
+            </a:blip>
+            <a:srcRect/>
+            <a:stretch>
+              <a:fillRect/>
+            </a:stretch>
+          </p:blipFill>
+          <p:spPr bwMode="auto">
+            <a:xfrm>
+              <a:off x="1569978" y="2651405"/>
+              <a:ext cx="959614" cy="641339"/>
+            </a:xfrm>
+            <a:prstGeom prst="rect">
+              <a:avLst/>
+            </a:prstGeom>
+            <a:noFill/>
+            <a:extLst>
+              <a:ext uri="{909E8E84-426E-40DD-AFC4-6F175D3DCCD1}">
+                <a14:hiddenFill xmlns:a14="http://schemas.microsoft.com/office/drawing/2010/main">
+                  <a:solidFill>
+                    <a:srgbClr val="FFFFFF"/>
+                  </a:solidFill>
+                </a14:hiddenFill>
+              </a:ext>
+            </a:extLst>
+          </p:spPr>
+        </p:pic>
+      </p:grpSp>
+      <p:pic>
+        <p:nvPicPr>
+          <p:cNvPr id="1032" name="Picture 8">
+            <a:extLst>
+              <a:ext uri="{FF2B5EF4-FFF2-40B4-BE49-F238E27FC236}">
+                <a16:creationId xmlns:a16="http://schemas.microsoft.com/office/drawing/2014/main" id="{5FBF93A0-BE8C-4558-ABAB-088FB617E41C}"/>
+              </a:ext>
+            </a:extLst>
+          </p:cNvPr>
+          <p:cNvPicPr>
+            <a:picLocks noChangeAspect="1" noChangeArrowheads="1"/>
+          </p:cNvPicPr>
+          <p:nvPr/>
+        </p:nvPicPr>
+        <p:blipFill>
+          <a:blip r:embed="rId5">
+            <a:clrChange>
+              <a:clrFrom>
+                <a:srgbClr val="FFFFFF"/>
+              </a:clrFrom>
+              <a:clrTo>
+                <a:srgbClr val="FFFFFF">
+                  <a:alpha val="0"/>
+                </a:srgbClr>
+              </a:clrTo>
+            </a:clrChange>
+            <a:extLst>
+              <a:ext uri="{28A0092B-C50C-407E-A947-70E740481C1C}">
+                <a14:useLocalDpi xmlns:a14="http://schemas.microsoft.com/office/drawing/2010/main" val="0"/>
+              </a:ext>
+            </a:extLst>
+          </a:blip>
+          <a:srcRect/>
+          <a:stretch>
+            <a:fillRect/>
+          </a:stretch>
+        </p:blipFill>
+        <p:spPr bwMode="auto">
+          <a:xfrm>
+            <a:off x="1041998" y="1877041"/>
+            <a:ext cx="531904" cy="531904"/>
+          </a:xfrm>
+          <a:prstGeom prst="rect">
+            <a:avLst/>
+          </a:prstGeom>
+          <a:noFill/>
+          <a:extLst>
+            <a:ext uri="{909E8E84-426E-40DD-AFC4-6F175D3DCCD1}">
+              <a14:hiddenFill xmlns:a14="http://schemas.microsoft.com/office/drawing/2010/main">
+                <a:solidFill>
+                  <a:srgbClr val="FFFFFF"/>
+                </a:solidFill>
+              </a14:hiddenFill>
+            </a:ext>
+          </a:extLst>
+        </p:spPr>
+      </p:pic>
+      <p:pic>
+        <p:nvPicPr>
+          <p:cNvPr id="32" name="Picture 2">
+            <a:extLst>
+              <a:ext uri="{FF2B5EF4-FFF2-40B4-BE49-F238E27FC236}">
+                <a16:creationId xmlns:a16="http://schemas.microsoft.com/office/drawing/2014/main" id="{8B72C3E9-85E6-4CA7-A422-7AFC5B84BC1E}"/>
+              </a:ext>
+            </a:extLst>
+          </p:cNvPr>
+          <p:cNvPicPr>
+            <a:picLocks noChangeAspect="1" noChangeArrowheads="1"/>
+          </p:cNvPicPr>
+          <p:nvPr/>
+        </p:nvPicPr>
+        <p:blipFill>
+          <a:blip r:embed="rId2">
+            <a:clrChange>
+              <a:clrFrom>
+                <a:srgbClr val="FFFFFF"/>
+              </a:clrFrom>
+              <a:clrTo>
+                <a:srgbClr val="FFFFFF">
+                  <a:alpha val="0"/>
+                </a:srgbClr>
+              </a:clrTo>
+            </a:clrChange>
+            <a:duotone>
+              <a:schemeClr val="accent2">
+                <a:shade val="45000"/>
+                <a:satMod val="135000"/>
+              </a:schemeClr>
+              <a:prstClr val="white"/>
+            </a:duotone>
+            <a:extLst>
+              <a:ext uri="{28A0092B-C50C-407E-A947-70E740481C1C}">
+                <a14:useLocalDpi xmlns:a14="http://schemas.microsoft.com/office/drawing/2010/main" val="0"/>
+              </a:ext>
+            </a:extLst>
+          </a:blip>
+          <a:srcRect/>
+          <a:stretch>
+            <a:fillRect/>
+          </a:stretch>
+        </p:blipFill>
+        <p:spPr bwMode="auto">
+          <a:xfrm>
+            <a:off x="2898279" y="1566422"/>
+            <a:ext cx="1431009" cy="1431009"/>
+          </a:xfrm>
+          <a:prstGeom prst="rect">
+            <a:avLst/>
+          </a:prstGeom>
+          <a:noFill/>
+          <a:extLst>
+            <a:ext uri="{909E8E84-426E-40DD-AFC4-6F175D3DCCD1}">
+              <a14:hiddenFill xmlns:a14="http://schemas.microsoft.com/office/drawing/2010/main">
+                <a:solidFill>
+                  <a:srgbClr val="FFFFFF"/>
+                </a:solidFill>
+              </a14:hiddenFill>
+            </a:ext>
+          </a:extLst>
+        </p:spPr>
+      </p:pic>
+      <p:sp>
+        <p:nvSpPr>
+          <p:cNvPr id="18" name="Arrow: Left-Right 17">
+            <a:extLst>
+              <a:ext uri="{FF2B5EF4-FFF2-40B4-BE49-F238E27FC236}">
+                <a16:creationId xmlns:a16="http://schemas.microsoft.com/office/drawing/2014/main" id="{7868ACE6-6A31-4C35-897B-DCC2F01F9732}"/>
+              </a:ext>
+            </a:extLst>
+          </p:cNvPr>
+          <p:cNvSpPr/>
+          <p:nvPr/>
+        </p:nvSpPr>
+        <p:spPr>
+          <a:xfrm>
+            <a:off x="1938692" y="2294990"/>
+            <a:ext cx="913726" cy="220481"/>
+          </a:xfrm>
+          <a:prstGeom prst="leftRightArrow">
+            <a:avLst/>
+          </a:prstGeom>
+          <a:solidFill>
+            <a:schemeClr val="bg1">
+              <a:lumMod val="75000"/>
+            </a:schemeClr>
+          </a:solidFill>
+          <a:ln>
+            <a:noFill/>
+          </a:ln>
+        </p:spPr>
+        <p:style>
+          <a:lnRef idx="2">
+            <a:schemeClr val="dk1">
+              <a:shade val="50000"/>
+            </a:schemeClr>
+          </a:lnRef>
+          <a:fillRef idx="1">
+            <a:schemeClr val="dk1"/>
+          </a:fillRef>
+          <a:effectRef idx="0">
+            <a:schemeClr val="dk1"/>
+          </a:effectRef>
+          <a:fontRef idx="minor">
+            <a:schemeClr val="lt1"/>
+          </a:fontRef>
+        </p:style>
+        <p:txBody>
+          <a:bodyPr rtlCol="0" anchor="ctr"/>
+          <a:lstStyle/>
+          <a:p>
+            <a:pPr algn="ctr"/>
+            <a:endParaRPr lang="en-US" sz="1400"/>
+          </a:p>
+        </p:txBody>
+      </p:sp>
+      <p:sp>
+        <p:nvSpPr>
+          <p:cNvPr id="19" name="TextBox 18">
+            <a:extLst>
+              <a:ext uri="{FF2B5EF4-FFF2-40B4-BE49-F238E27FC236}">
+                <a16:creationId xmlns:a16="http://schemas.microsoft.com/office/drawing/2014/main" id="{5B2539B0-17EF-4224-8DB4-04686653A754}"/>
+              </a:ext>
+            </a:extLst>
+          </p:cNvPr>
+          <p:cNvSpPr txBox="1"/>
+          <p:nvPr/>
+        </p:nvSpPr>
+        <p:spPr>
+          <a:xfrm>
+            <a:off x="1811072" y="2057841"/>
+            <a:ext cx="1187261" cy="307777"/>
+          </a:xfrm>
+          <a:prstGeom prst="rect">
+            <a:avLst/>
+          </a:prstGeom>
+          <a:noFill/>
+        </p:spPr>
+        <p:txBody>
+          <a:bodyPr wrap="square" rtlCol="0">
+            <a:spAutoFit/>
+          </a:bodyPr>
+          <a:lstStyle/>
+          <a:p>
+            <a:pPr algn="ctr"/>
+            <a:r>
+              <a:rPr lang="en-US" sz="1400" dirty="0"/>
+              <a:t>SSH</a:t>
+            </a:r>
+          </a:p>
+        </p:txBody>
+      </p:sp>
+      <p:sp>
+        <p:nvSpPr>
+          <p:cNvPr id="33" name="TextBox 32">
+            <a:extLst>
+              <a:ext uri="{FF2B5EF4-FFF2-40B4-BE49-F238E27FC236}">
+                <a16:creationId xmlns:a16="http://schemas.microsoft.com/office/drawing/2014/main" id="{F6395334-AA74-4B7C-B517-1F45D4FC927A}"/>
+              </a:ext>
+            </a:extLst>
+          </p:cNvPr>
+          <p:cNvSpPr txBox="1"/>
+          <p:nvPr/>
+        </p:nvSpPr>
+        <p:spPr>
+          <a:xfrm>
+            <a:off x="3646937" y="2859126"/>
+            <a:ext cx="1708994" cy="307777"/>
+          </a:xfrm>
+          <a:prstGeom prst="rect">
+            <a:avLst/>
+          </a:prstGeom>
+          <a:noFill/>
+        </p:spPr>
+        <p:txBody>
+          <a:bodyPr wrap="none" rtlCol="0">
+            <a:spAutoFit/>
+          </a:bodyPr>
+          <a:lstStyle/>
+          <a:p>
+            <a:pPr algn="ctr"/>
+            <a:r>
+              <a:rPr lang="en-US" sz="1400" dirty="0"/>
+              <a:t>portal.cs.virginia.edu</a:t>
+            </a:r>
+          </a:p>
+        </p:txBody>
+      </p:sp>
+      <p:pic>
+        <p:nvPicPr>
+          <p:cNvPr id="37" name="Picture 2">
+            <a:extLst>
+              <a:ext uri="{FF2B5EF4-FFF2-40B4-BE49-F238E27FC236}">
+                <a16:creationId xmlns:a16="http://schemas.microsoft.com/office/drawing/2014/main" id="{9691B187-AE9C-40A4-BE21-E4512AB985F7}"/>
+              </a:ext>
+            </a:extLst>
+          </p:cNvPr>
+          <p:cNvPicPr>
+            <a:picLocks noChangeAspect="1" noChangeArrowheads="1"/>
+          </p:cNvPicPr>
+          <p:nvPr/>
+        </p:nvPicPr>
+        <p:blipFill>
+          <a:blip r:embed="rId2">
+            <a:clrChange>
+              <a:clrFrom>
+                <a:srgbClr val="FFFFFF"/>
+              </a:clrFrom>
+              <a:clrTo>
+                <a:srgbClr val="FFFFFF">
+                  <a:alpha val="0"/>
+                </a:srgbClr>
+              </a:clrTo>
+            </a:clrChange>
+            <a:extLst>
+              <a:ext uri="{28A0092B-C50C-407E-A947-70E740481C1C}">
+                <a14:useLocalDpi xmlns:a14="http://schemas.microsoft.com/office/drawing/2010/main" val="0"/>
+              </a:ext>
+            </a:extLst>
+          </a:blip>
+          <a:srcRect/>
+          <a:stretch>
+            <a:fillRect/>
+          </a:stretch>
+        </p:blipFill>
+        <p:spPr bwMode="auto">
+          <a:xfrm>
+            <a:off x="5857094" y="2415417"/>
+            <a:ext cx="1431009" cy="1431009"/>
+          </a:xfrm>
+          <a:prstGeom prst="rect">
+            <a:avLst/>
+          </a:prstGeom>
+          <a:noFill/>
+          <a:extLst>
+            <a:ext uri="{909E8E84-426E-40DD-AFC4-6F175D3DCCD1}">
+              <a14:hiddenFill xmlns:a14="http://schemas.microsoft.com/office/drawing/2010/main">
+                <a:solidFill>
+                  <a:srgbClr val="FFFFFF"/>
+                </a:solidFill>
+              </a14:hiddenFill>
+            </a:ext>
+          </a:extLst>
+        </p:spPr>
+      </p:pic>
+      <p:sp>
+        <p:nvSpPr>
+          <p:cNvPr id="40" name="Arrow: Left-Right 39">
+            <a:extLst>
+              <a:ext uri="{FF2B5EF4-FFF2-40B4-BE49-F238E27FC236}">
+                <a16:creationId xmlns:a16="http://schemas.microsoft.com/office/drawing/2014/main" id="{CCF156F0-AB31-4C8F-A79F-DA4DB8869AC8}"/>
+              </a:ext>
+            </a:extLst>
+          </p:cNvPr>
+          <p:cNvSpPr/>
+          <p:nvPr/>
+        </p:nvSpPr>
+        <p:spPr>
+          <a:xfrm rot="20700000">
+            <a:off x="4281586" y="1779806"/>
+            <a:ext cx="1420150" cy="220481"/>
+          </a:xfrm>
+          <a:prstGeom prst="leftRightArrow">
+            <a:avLst/>
+          </a:prstGeom>
+          <a:solidFill>
+            <a:schemeClr val="bg1">
+              <a:lumMod val="75000"/>
+            </a:schemeClr>
+          </a:solidFill>
+          <a:ln>
+            <a:noFill/>
+          </a:ln>
+        </p:spPr>
+        <p:style>
+          <a:lnRef idx="2">
+            <a:schemeClr val="dk1">
+              <a:shade val="50000"/>
+            </a:schemeClr>
+          </a:lnRef>
+          <a:fillRef idx="1">
+            <a:schemeClr val="dk1"/>
+          </a:fillRef>
+          <a:effectRef idx="0">
+            <a:schemeClr val="dk1"/>
+          </a:effectRef>
+          <a:fontRef idx="minor">
+            <a:schemeClr val="lt1"/>
+          </a:fontRef>
+        </p:style>
+        <p:txBody>
+          <a:bodyPr rtlCol="0" anchor="ctr"/>
+          <a:lstStyle/>
+          <a:p>
+            <a:pPr algn="ctr"/>
+            <a:endParaRPr lang="en-US" sz="1400"/>
+          </a:p>
+        </p:txBody>
+      </p:sp>
+      <p:sp>
+        <p:nvSpPr>
+          <p:cNvPr id="44" name="TextBox 43">
+            <a:extLst>
+              <a:ext uri="{FF2B5EF4-FFF2-40B4-BE49-F238E27FC236}">
+                <a16:creationId xmlns:a16="http://schemas.microsoft.com/office/drawing/2014/main" id="{F477C592-041F-4086-B4F1-1B4F9303EE00}"/>
+              </a:ext>
+            </a:extLst>
+          </p:cNvPr>
+          <p:cNvSpPr txBox="1"/>
+          <p:nvPr/>
+        </p:nvSpPr>
+        <p:spPr>
+          <a:xfrm>
+            <a:off x="4501434" y="4620995"/>
+            <a:ext cx="1785617" cy="307777"/>
+          </a:xfrm>
+          <a:prstGeom prst="rect">
+            <a:avLst/>
+          </a:prstGeom>
+          <a:noFill/>
+        </p:spPr>
+        <p:txBody>
+          <a:bodyPr wrap="none" rtlCol="0">
+            <a:spAutoFit/>
+          </a:bodyPr>
+          <a:lstStyle/>
+          <a:p>
+            <a:pPr algn="ctr"/>
+            <a:r>
+              <a:rPr lang="en-US" sz="1400" dirty="0"/>
+              <a:t>UVA campus network</a:t>
+            </a:r>
+          </a:p>
+        </p:txBody>
+      </p:sp>
+      <p:sp>
+        <p:nvSpPr>
+          <p:cNvPr id="46" name="TextBox 45">
+            <a:extLst>
+              <a:ext uri="{FF2B5EF4-FFF2-40B4-BE49-F238E27FC236}">
+                <a16:creationId xmlns:a16="http://schemas.microsoft.com/office/drawing/2014/main" id="{B8EAED92-ED35-4786-801D-DD7A58C39078}"/>
+              </a:ext>
+            </a:extLst>
+          </p:cNvPr>
+          <p:cNvSpPr txBox="1"/>
+          <p:nvPr/>
+        </p:nvSpPr>
+        <p:spPr>
+          <a:xfrm>
+            <a:off x="4225907" y="1484896"/>
+            <a:ext cx="1187261" cy="307777"/>
+          </a:xfrm>
+          <a:prstGeom prst="rect">
+            <a:avLst/>
+          </a:prstGeom>
+          <a:noFill/>
+        </p:spPr>
+        <p:txBody>
+          <a:bodyPr wrap="square" rtlCol="0">
+            <a:spAutoFit/>
+          </a:bodyPr>
+          <a:lstStyle/>
+          <a:p>
+            <a:pPr algn="ctr"/>
+            <a:r>
+              <a:rPr lang="en-US" sz="1400" dirty="0"/>
+              <a:t>SSH</a:t>
+            </a:r>
+          </a:p>
+        </p:txBody>
+      </p:sp>
+    </p:spTree>
+    <p:extLst>
+      <p:ext uri="{BB962C8B-B14F-4D97-AF65-F5344CB8AC3E}">
+        <p14:creationId xmlns:p14="http://schemas.microsoft.com/office/powerpoint/2010/main" val="1114851383"/>
+      </p:ext>
+    </p:extLst>
+  </p:cSld>
+  <p:clrMapOvr>
+    <a:masterClrMapping/>
+  </p:clrMapOvr>
+</p:sld>
+</file>
+
+<file path=ppt/slides/slide3.xml><?xml version="1.0" encoding="utf-8"?>
+<p:sld xmlns:a="http://schemas.openxmlformats.org/drawingml/2006/main" xmlns:r="http://schemas.openxmlformats.org/officeDocument/2006/relationships" xmlns:p="http://schemas.openxmlformats.org/presentationml/2006/main">
+  <p:cSld>
+    <p:spTree>
+      <p:nvGrpSpPr>
+        <p:cNvPr id="1" name=""/>
+        <p:cNvGrpSpPr/>
+        <p:nvPr/>
+      </p:nvGrpSpPr>
+      <p:grpSpPr>
+        <a:xfrm>
+          <a:off x="0" y="0"/>
+          <a:ext cx="0" cy="0"/>
+          <a:chOff x="0" y="0"/>
+          <a:chExt cx="0" cy="0"/>
+        </a:xfrm>
+      </p:grpSpPr>
+      <p:sp>
+        <p:nvSpPr>
           <p:cNvPr id="9" name="Left Bracket 8">
             <a:extLst>
               <a:ext uri="{FF2B5EF4-FFF2-40B4-BE49-F238E27FC236}">
@@ -3384,15 +5689,15 @@
               <a:gd name="connsiteX1" fmla="*/ 0 w 3915629"/>
               <a:gd name="connsiteY1" fmla="*/ 4009445 h 4950723"/>
               <a:gd name="connsiteX2" fmla="*/ 0 w 3915629"/>
-              <a:gd name="connsiteY2" fmla="*/ 3559447 h 4950723"/>
+              <a:gd name="connsiteY2" fmla="*/ 3436720 h 4950723"/>
               <a:gd name="connsiteX3" fmla="*/ 0 w 3915629"/>
-              <a:gd name="connsiteY3" fmla="*/ 3017404 h 4950723"/>
+              <a:gd name="connsiteY3" fmla="*/ 2863996 h 4950723"/>
               <a:gd name="connsiteX4" fmla="*/ 0 w 3915629"/>
               <a:gd name="connsiteY4" fmla="*/ 2444680 h 4950723"/>
               <a:gd name="connsiteX5" fmla="*/ 0 w 3915629"/>
-              <a:gd name="connsiteY5" fmla="*/ 1964000 h 4950723"/>
+              <a:gd name="connsiteY5" fmla="*/ 1902637 h 4950723"/>
               <a:gd name="connsiteX6" fmla="*/ 0 w 3915629"/>
-              <a:gd name="connsiteY6" fmla="*/ 1483321 h 4950723"/>
+              <a:gd name="connsiteY6" fmla="*/ 1391276 h 4950723"/>
               <a:gd name="connsiteX7" fmla="*/ 0 w 3915629"/>
               <a:gd name="connsiteY7" fmla="*/ 941278 h 4950723"/>
               <a:gd name="connsiteX8" fmla="*/ 3915629 w 3915629"/>
@@ -3527,6 +5832,51 @@
                 <a:close/>
               </a:path>
               <a:path w="3915629" h="4950723" fill="none" extrusionOk="0">
+                <a:moveTo>
+                  <a:pt x="3915629" y="4950723"/>
+                </a:moveTo>
+                <a:cubicBezTo>
+                  <a:pt x="1704547" y="4916149"/>
+                  <a:pt x="-63147" y="4669402"/>
+                  <a:pt x="0" y="4009445"/>
+                </a:cubicBezTo>
+                <a:cubicBezTo>
+                  <a:pt x="-56776" y="3754467"/>
+                  <a:pt x="31530" y="3713963"/>
+                  <a:pt x="0" y="3436720"/>
+                </a:cubicBezTo>
+                <a:cubicBezTo>
+                  <a:pt x="-31530" y="3159477"/>
+                  <a:pt x="6095" y="3139948"/>
+                  <a:pt x="0" y="2863996"/>
+                </a:cubicBezTo>
+                <a:cubicBezTo>
+                  <a:pt x="-6095" y="2588044"/>
+                  <a:pt x="23572" y="2558964"/>
+                  <a:pt x="0" y="2444680"/>
+                </a:cubicBezTo>
+                <a:cubicBezTo>
+                  <a:pt x="-23572" y="2330396"/>
+                  <a:pt x="22964" y="2072730"/>
+                  <a:pt x="0" y="1902637"/>
+                </a:cubicBezTo>
+                <a:cubicBezTo>
+                  <a:pt x="-22964" y="1732544"/>
+                  <a:pt x="49013" y="1542364"/>
+                  <a:pt x="0" y="1391276"/>
+                </a:cubicBezTo>
+                <a:cubicBezTo>
+                  <a:pt x="-49013" y="1240188"/>
+                  <a:pt x="16016" y="1110659"/>
+                  <a:pt x="0" y="941278"/>
+                </a:cubicBezTo>
+                <a:cubicBezTo>
+                  <a:pt x="431704" y="224517"/>
+                  <a:pt x="1391877" y="171867"/>
+                  <a:pt x="3915629" y="0"/>
+                </a:cubicBezTo>
+              </a:path>
+              <a:path w="3915629" h="4950723" fill="none" stroke="0" extrusionOk="0">
                 <a:moveTo>
                   <a:pt x="3915629" y="4950723"/>
                 </a:moveTo>

</xml_diff>